<commit_message>
chore: added PowerPoint presentation and documentation to resources package
</commit_message>
<xml_diff>
--- a/src/resources/StudentManagementApplication-DraghiciAndreeaMaria-CR3.1B.pptx
+++ b/src/resources/StudentManagementApplication-DraghiciAndreeaMaria-CR3.1B.pptx
@@ -9,7 +9,9 @@
     <p:sldId id="257" r:id="rId3"/>
     <p:sldId id="258" r:id="rId4"/>
     <p:sldId id="259" r:id="rId5"/>
-    <p:sldId id="260" r:id="rId6"/>
+    <p:sldId id="261" r:id="rId6"/>
+    <p:sldId id="262" r:id="rId7"/>
+    <p:sldId id="260" r:id="rId8"/>
   </p:sldIdLst>
   <p:sldSz cx="9144000" cy="6858000" type="screen4x3"/>
   <p:notesSz cx="6858000" cy="9144000"/>
@@ -3546,7 +3548,7 @@
         <p:spPr>
           <a:xfrm>
             <a:off x="304800" y="5029200"/>
-            <a:ext cx="3048000" cy="1295400"/>
+            <a:ext cx="2286000" cy="914400"/>
           </a:xfrm>
         </p:spPr>
         <p:style>
@@ -3571,7 +3573,7 @@
           <a:p>
             <a:pPr algn="l"/>
             <a:r>
-              <a:rPr lang="en-US" dirty="0" smtClean="0">
+              <a:rPr lang="en-US" b="1" dirty="0" smtClean="0">
                 <a:solidFill>
                   <a:srgbClr val="FFFF00"/>
                 </a:solidFill>
@@ -3582,7 +3584,7 @@
           <a:p>
             <a:pPr algn="l"/>
             <a:r>
-              <a:rPr lang="en-US" dirty="0" smtClean="0">
+              <a:rPr lang="en-US" b="1" dirty="0" smtClean="0">
                 <a:solidFill>
                   <a:srgbClr val="FFFF00"/>
                 </a:solidFill>
@@ -3607,7 +3609,7 @@
         </p:nvSpPr>
         <p:spPr>
           <a:xfrm>
-            <a:off x="1905000" y="304800"/>
+            <a:off x="1143000" y="304800"/>
             <a:ext cx="7086600" cy="1905001"/>
           </a:xfrm>
         </p:spPr>
@@ -3632,15 +3634,31 @@
           <a:lstStyle/>
           <a:p>
             <a:r>
+              <a:rPr lang="en-US" b="1" dirty="0" smtClean="0">
+                <a:solidFill>
+                  <a:srgbClr val="FFFF00"/>
+                </a:solidFill>
+              </a:rPr>
+              <a:t>Aplicatie desktop:</a:t>
+            </a:r>
+            <a:br>
+              <a:rPr lang="en-US" b="1" dirty="0" smtClean="0">
+                <a:solidFill>
+                  <a:srgbClr val="FFFF00"/>
+                </a:solidFill>
+              </a:rPr>
+            </a:br>
+            <a:r>
+              <a:rPr lang="en-US" b="1" dirty="0" smtClean="0">
+                <a:solidFill>
+                  <a:srgbClr val="FFFF00"/>
+                </a:solidFill>
+              </a:rPr>
+              <a:t>Student Management</a:t>
+            </a:r>
+            <a:r>
               <a:rPr lang="en-US" dirty="0" smtClean="0"/>
-              <a:t>Aplicatie desktop:</a:t>
-            </a:r>
-            <a:br>
-              <a:rPr lang="en-US" dirty="0" smtClean="0"/>
-            </a:br>
-            <a:r>
-              <a:rPr lang="en-US" dirty="0" smtClean="0"/>
-              <a:t>Student Management</a:t>
+              <a:t/>
             </a:r>
             <a:br>
               <a:rPr lang="en-US" dirty="0" smtClean="0"/>
@@ -3659,13 +3677,13 @@
   <p:clrMapOvr>
     <a:masterClrMapping/>
   </p:clrMapOvr>
-  <mc:AlternateContent xmlns:mc="http://schemas.openxmlformats.org/markup-compatibility/2006">
-    <mc:Choice xmlns:p14="http://schemas.microsoft.com/office/powerpoint/2010/main" Requires="p14">
+  <mc:AlternateContent xmlns:mc="http://schemas.openxmlformats.org/markup-compatibility/2006" xmlns:p14="http://schemas.microsoft.com/office/powerpoint/2010/main">
+    <mc:Choice Requires="p14">
       <p:transition spd="med" p14:dur="700">
         <p:fade/>
       </p:transition>
     </mc:Choice>
-    <mc:Fallback>
+    <mc:Fallback xmlns="">
       <p:transition spd="med">
         <p:fade/>
       </p:transition>
@@ -3710,8 +3728,8 @@
         </p:nvSpPr>
         <p:spPr>
           <a:xfrm>
-            <a:off x="4267200" y="609600"/>
-            <a:ext cx="4730750" cy="5699338"/>
+            <a:off x="4114800" y="228601"/>
+            <a:ext cx="4800600" cy="5286268"/>
           </a:xfrm>
         </p:spPr>
         <p:style>
@@ -3730,11 +3748,11 @@
         </p:style>
         <p:txBody>
           <a:bodyPr>
-            <a:normAutofit fontScale="92500" lnSpcReduction="10000"/>
+            <a:normAutofit fontScale="92500" lnSpcReduction="20000"/>
           </a:bodyPr>
           <a:lstStyle/>
           <a:p>
-            <a:pPr>
+            <a:pPr algn="just">
               <a:buFont typeface="Wingdings" pitchFamily="2" charset="2"/>
               <a:buChar char="v"/>
             </a:pPr>
@@ -3857,7 +3875,7 @@
             </a:r>
           </a:p>
           <a:p>
-            <a:pPr>
+            <a:pPr algn="just">
               <a:buFont typeface="Wingdings" pitchFamily="2" charset="2"/>
               <a:buChar char="v"/>
             </a:pPr>
@@ -3869,7 +3887,7 @@
             </a:endParaRPr>
           </a:p>
           <a:p>
-            <a:pPr>
+            <a:pPr algn="just">
               <a:buFont typeface="Wingdings" pitchFamily="2" charset="2"/>
               <a:buChar char="v"/>
             </a:pPr>
@@ -3943,7 +3961,16 @@
                 </a:solidFill>
                 <a:latin typeface="+mj-lt"/>
               </a:rPr>
-              <a:t> pentru </a:t>
+              <a:t> pentru o </a:t>
+            </a:r>
+            <a:r>
+              <a:rPr lang="en-US" sz="2400" dirty="0" err="1" smtClean="0">
+                <a:solidFill>
+                  <a:srgbClr val="00B0F0"/>
+                </a:solidFill>
+                <a:latin typeface="+mj-lt"/>
+              </a:rPr>
+              <a:t>disciplina</a:t>
             </a:r>
             <a:r>
               <a:rPr lang="en-US" sz="2400" dirty="0" smtClean="0">
@@ -3952,7 +3979,7 @@
                 </a:solidFill>
                 <a:latin typeface="+mj-lt"/>
               </a:rPr>
-              <a:t>o </a:t>
+              <a:t> </a:t>
             </a:r>
             <a:r>
               <a:rPr lang="en-US" sz="2400" dirty="0" err="1" smtClean="0">
@@ -3961,7 +3988,7 @@
                 </a:solidFill>
                 <a:latin typeface="+mj-lt"/>
               </a:rPr>
-              <a:t>disciplina</a:t>
+              <a:t>specificata</a:t>
             </a:r>
             <a:r>
               <a:rPr lang="en-US" sz="2400" dirty="0" smtClean="0">
@@ -3979,7 +4006,7 @@
                 </a:solidFill>
                 <a:latin typeface="+mj-lt"/>
               </a:rPr>
-              <a:t>specificata</a:t>
+              <a:t>intr</a:t>
             </a:r>
             <a:r>
               <a:rPr lang="en-US" sz="2400" dirty="0" smtClean="0">
@@ -3988,7 +4015,7 @@
                 </a:solidFill>
                 <a:latin typeface="+mj-lt"/>
               </a:rPr>
-              <a:t> </a:t>
+              <a:t>-un </a:t>
             </a:r>
             <a:r>
               <a:rPr lang="en-US" sz="2400" dirty="0" err="1" smtClean="0">
@@ -3997,7 +4024,7 @@
                 </a:solidFill>
                 <a:latin typeface="+mj-lt"/>
               </a:rPr>
-              <a:t>intr</a:t>
+              <a:t>fisier</a:t>
             </a:r>
             <a:r>
               <a:rPr lang="en-US" sz="2400" dirty="0" smtClean="0">
@@ -4006,29 +4033,11 @@
                 </a:solidFill>
                 <a:latin typeface="+mj-lt"/>
               </a:rPr>
-              <a:t>-un </a:t>
-            </a:r>
-            <a:r>
-              <a:rPr lang="en-US" sz="2400" dirty="0" err="1" smtClean="0">
-                <a:solidFill>
-                  <a:srgbClr val="00B0F0"/>
-                </a:solidFill>
-                <a:latin typeface="+mj-lt"/>
-              </a:rPr>
-              <a:t>fisier</a:t>
-            </a:r>
-            <a:r>
-              <a:rPr lang="en-US" sz="2400" dirty="0" smtClean="0">
-                <a:solidFill>
-                  <a:srgbClr val="00B0F0"/>
-                </a:solidFill>
-                <a:latin typeface="+mj-lt"/>
-              </a:rPr>
               <a:t> XML.</a:t>
             </a:r>
           </a:p>
           <a:p>
-            <a:pPr>
+            <a:pPr algn="just">
               <a:buFont typeface="Wingdings" pitchFamily="2" charset="2"/>
               <a:buChar char="v"/>
             </a:pPr>
@@ -4040,7 +4049,7 @@
             </a:endParaRPr>
           </a:p>
           <a:p>
-            <a:pPr>
+            <a:pPr algn="just">
               <a:buFont typeface="Wingdings" pitchFamily="2" charset="2"/>
               <a:buChar char="v"/>
             </a:pPr>
@@ -4308,7 +4317,7 @@
         </p:nvSpPr>
         <p:spPr>
           <a:xfrm>
-            <a:off x="533400" y="304800"/>
+            <a:off x="251346" y="152400"/>
             <a:ext cx="3048000" cy="381000"/>
           </a:xfrm>
         </p:spPr>
@@ -4333,7 +4342,7 @@
           <a:lstStyle/>
           <a:p>
             <a:r>
-              <a:rPr lang="en-US" sz="2000" dirty="0" err="1" smtClean="0">
+              <a:rPr lang="en-US" sz="2000" b="1" dirty="0" err="1" smtClean="0">
                 <a:solidFill>
                   <a:srgbClr val="FFFF00"/>
                 </a:solidFill>
@@ -4341,14 +4350,14 @@
               <a:t>Detalii</a:t>
             </a:r>
             <a:r>
-              <a:rPr lang="en-US" sz="2000" dirty="0" smtClean="0">
+              <a:rPr lang="en-US" sz="2000" b="1" dirty="0" smtClean="0">
                 <a:solidFill>
                   <a:srgbClr val="FFFF00"/>
                 </a:solidFill>
               </a:rPr>
               <a:t> despre aplicatie</a:t>
             </a:r>
-            <a:endParaRPr lang="en-US" sz="2000" dirty="0">
+            <a:endParaRPr lang="en-US" sz="2000" b="1" dirty="0">
               <a:solidFill>
                 <a:srgbClr val="FFFF00"/>
               </a:solidFill>
@@ -4377,8 +4386,8 @@
         </p:blipFill>
         <p:spPr bwMode="auto">
           <a:xfrm>
-            <a:off x="129653" y="986051"/>
-            <a:ext cx="3896437" cy="5322888"/>
+            <a:off x="228600" y="914400"/>
+            <a:ext cx="3657600" cy="4800600"/>
           </a:xfrm>
           <a:prstGeom prst="rect">
             <a:avLst/>
@@ -4418,8 +4427,8 @@
           </a:extLst>
         </p:spPr>
       </p:pic>
-      <mc:AlternateContent xmlns:mc="http://schemas.openxmlformats.org/markup-compatibility/2006">
-        <mc:Choice xmlns:p14="http://schemas.microsoft.com/office/powerpoint/2010/main" Requires="p14">
+      <mc:AlternateContent xmlns:mc="http://schemas.openxmlformats.org/markup-compatibility/2006" xmlns:p14="http://schemas.microsoft.com/office/powerpoint/2010/main">
+        <mc:Choice Requires="p14">
           <p:contentPart p14:bwMode="auto" r:id="rId3">
             <p14:nvContentPartPr>
               <p14:cNvPr id="5" name="Ink 4"/>
@@ -4432,7 +4441,7 @@
             </p14:xfrm>
           </p:contentPart>
         </mc:Choice>
-        <mc:Fallback>
+        <mc:Fallback xmlns="">
           <p:pic>
             <p:nvPicPr>
               <p:cNvPr id="5" name="Ink 4"/>
@@ -4473,7 +4482,752 @@
   <p:timing>
     <p:tnLst>
       <p:par>
-        <p:cTn id="1" dur="indefinite" restart="never" nodeType="tmRoot"/>
+        <p:cTn id="1" dur="indefinite" restart="never" nodeType="tmRoot">
+          <p:childTnLst>
+            <p:seq concurrent="1" nextAc="seek">
+              <p:cTn id="2" dur="indefinite" nodeType="mainSeq">
+                <p:childTnLst>
+                  <p:par>
+                    <p:cTn id="3" fill="hold">
+                      <p:stCondLst>
+                        <p:cond delay="indefinite"/>
+                      </p:stCondLst>
+                      <p:childTnLst>
+                        <p:par>
+                          <p:cTn id="4" fill="hold">
+                            <p:stCondLst>
+                              <p:cond delay="0"/>
+                            </p:stCondLst>
+                            <p:childTnLst>
+                              <p:par>
+                                <p:cTn id="5" presetID="31" presetClass="entr" presetSubtype="0" fill="hold" nodeType="clickEffect">
+                                  <p:stCondLst>
+                                    <p:cond delay="0"/>
+                                  </p:stCondLst>
+                                  <p:childTnLst>
+                                    <p:set>
+                                      <p:cBhvr>
+                                        <p:cTn id="6" dur="1" fill="hold">
+                                          <p:stCondLst>
+                                            <p:cond delay="0"/>
+                                          </p:stCondLst>
+                                        </p:cTn>
+                                        <p:tgtEl>
+                                          <p:spTgt spid="3">
+                                            <p:txEl>
+                                              <p:pRg st="0" end="0"/>
+                                            </p:txEl>
+                                          </p:spTgt>
+                                        </p:tgtEl>
+                                        <p:attrNameLst>
+                                          <p:attrName>style.visibility</p:attrName>
+                                        </p:attrNameLst>
+                                      </p:cBhvr>
+                                      <p:to>
+                                        <p:strVal val="visible"/>
+                                      </p:to>
+                                    </p:set>
+                                    <p:anim calcmode="lin" valueType="num">
+                                      <p:cBhvr>
+                                        <p:cTn id="7" dur="1000" fill="hold"/>
+                                        <p:tgtEl>
+                                          <p:spTgt spid="3">
+                                            <p:txEl>
+                                              <p:pRg st="0" end="0"/>
+                                            </p:txEl>
+                                          </p:spTgt>
+                                        </p:tgtEl>
+                                        <p:attrNameLst>
+                                          <p:attrName>ppt_w</p:attrName>
+                                        </p:attrNameLst>
+                                      </p:cBhvr>
+                                      <p:tavLst>
+                                        <p:tav tm="0">
+                                          <p:val>
+                                            <p:fltVal val="0"/>
+                                          </p:val>
+                                        </p:tav>
+                                        <p:tav tm="100000">
+                                          <p:val>
+                                            <p:strVal val="#ppt_w"/>
+                                          </p:val>
+                                        </p:tav>
+                                      </p:tavLst>
+                                    </p:anim>
+                                    <p:anim calcmode="lin" valueType="num">
+                                      <p:cBhvr>
+                                        <p:cTn id="8" dur="1000" fill="hold"/>
+                                        <p:tgtEl>
+                                          <p:spTgt spid="3">
+                                            <p:txEl>
+                                              <p:pRg st="0" end="0"/>
+                                            </p:txEl>
+                                          </p:spTgt>
+                                        </p:tgtEl>
+                                        <p:attrNameLst>
+                                          <p:attrName>ppt_h</p:attrName>
+                                        </p:attrNameLst>
+                                      </p:cBhvr>
+                                      <p:tavLst>
+                                        <p:tav tm="0">
+                                          <p:val>
+                                            <p:fltVal val="0"/>
+                                          </p:val>
+                                        </p:tav>
+                                        <p:tav tm="100000">
+                                          <p:val>
+                                            <p:strVal val="#ppt_h"/>
+                                          </p:val>
+                                        </p:tav>
+                                      </p:tavLst>
+                                    </p:anim>
+                                    <p:anim calcmode="lin" valueType="num">
+                                      <p:cBhvr>
+                                        <p:cTn id="9" dur="1000" fill="hold"/>
+                                        <p:tgtEl>
+                                          <p:spTgt spid="3">
+                                            <p:txEl>
+                                              <p:pRg st="0" end="0"/>
+                                            </p:txEl>
+                                          </p:spTgt>
+                                        </p:tgtEl>
+                                        <p:attrNameLst>
+                                          <p:attrName>style.rotation</p:attrName>
+                                        </p:attrNameLst>
+                                      </p:cBhvr>
+                                      <p:tavLst>
+                                        <p:tav tm="0">
+                                          <p:val>
+                                            <p:fltVal val="90"/>
+                                          </p:val>
+                                        </p:tav>
+                                        <p:tav tm="100000">
+                                          <p:val>
+                                            <p:fltVal val="0"/>
+                                          </p:val>
+                                        </p:tav>
+                                      </p:tavLst>
+                                    </p:anim>
+                                    <p:animEffect transition="in" filter="fade">
+                                      <p:cBhvr>
+                                        <p:cTn id="10" dur="1000"/>
+                                        <p:tgtEl>
+                                          <p:spTgt spid="3">
+                                            <p:txEl>
+                                              <p:pRg st="0" end="0"/>
+                                            </p:txEl>
+                                          </p:spTgt>
+                                        </p:tgtEl>
+                                      </p:cBhvr>
+                                    </p:animEffect>
+                                  </p:childTnLst>
+                                </p:cTn>
+                              </p:par>
+                            </p:childTnLst>
+                          </p:cTn>
+                        </p:par>
+                      </p:childTnLst>
+                    </p:cTn>
+                  </p:par>
+                  <p:par>
+                    <p:cTn id="11" fill="hold">
+                      <p:stCondLst>
+                        <p:cond delay="indefinite"/>
+                      </p:stCondLst>
+                      <p:childTnLst>
+                        <p:par>
+                          <p:cTn id="12" fill="hold">
+                            <p:stCondLst>
+                              <p:cond delay="0"/>
+                            </p:stCondLst>
+                            <p:childTnLst>
+                              <p:par>
+                                <p:cTn id="13" presetID="31" presetClass="entr" presetSubtype="0" fill="hold" nodeType="clickEffect">
+                                  <p:stCondLst>
+                                    <p:cond delay="0"/>
+                                  </p:stCondLst>
+                                  <p:childTnLst>
+                                    <p:set>
+                                      <p:cBhvr>
+                                        <p:cTn id="14" dur="1" fill="hold">
+                                          <p:stCondLst>
+                                            <p:cond delay="0"/>
+                                          </p:stCondLst>
+                                        </p:cTn>
+                                        <p:tgtEl>
+                                          <p:spTgt spid="3">
+                                            <p:txEl>
+                                              <p:pRg st="2" end="2"/>
+                                            </p:txEl>
+                                          </p:spTgt>
+                                        </p:tgtEl>
+                                        <p:attrNameLst>
+                                          <p:attrName>style.visibility</p:attrName>
+                                        </p:attrNameLst>
+                                      </p:cBhvr>
+                                      <p:to>
+                                        <p:strVal val="visible"/>
+                                      </p:to>
+                                    </p:set>
+                                    <p:anim calcmode="lin" valueType="num">
+                                      <p:cBhvr>
+                                        <p:cTn id="15" dur="1000" fill="hold"/>
+                                        <p:tgtEl>
+                                          <p:spTgt spid="3">
+                                            <p:txEl>
+                                              <p:pRg st="2" end="2"/>
+                                            </p:txEl>
+                                          </p:spTgt>
+                                        </p:tgtEl>
+                                        <p:attrNameLst>
+                                          <p:attrName>ppt_w</p:attrName>
+                                        </p:attrNameLst>
+                                      </p:cBhvr>
+                                      <p:tavLst>
+                                        <p:tav tm="0">
+                                          <p:val>
+                                            <p:fltVal val="0"/>
+                                          </p:val>
+                                        </p:tav>
+                                        <p:tav tm="100000">
+                                          <p:val>
+                                            <p:strVal val="#ppt_w"/>
+                                          </p:val>
+                                        </p:tav>
+                                      </p:tavLst>
+                                    </p:anim>
+                                    <p:anim calcmode="lin" valueType="num">
+                                      <p:cBhvr>
+                                        <p:cTn id="16" dur="1000" fill="hold"/>
+                                        <p:tgtEl>
+                                          <p:spTgt spid="3">
+                                            <p:txEl>
+                                              <p:pRg st="2" end="2"/>
+                                            </p:txEl>
+                                          </p:spTgt>
+                                        </p:tgtEl>
+                                        <p:attrNameLst>
+                                          <p:attrName>ppt_h</p:attrName>
+                                        </p:attrNameLst>
+                                      </p:cBhvr>
+                                      <p:tavLst>
+                                        <p:tav tm="0">
+                                          <p:val>
+                                            <p:fltVal val="0"/>
+                                          </p:val>
+                                        </p:tav>
+                                        <p:tav tm="100000">
+                                          <p:val>
+                                            <p:strVal val="#ppt_h"/>
+                                          </p:val>
+                                        </p:tav>
+                                      </p:tavLst>
+                                    </p:anim>
+                                    <p:anim calcmode="lin" valueType="num">
+                                      <p:cBhvr>
+                                        <p:cTn id="17" dur="1000" fill="hold"/>
+                                        <p:tgtEl>
+                                          <p:spTgt spid="3">
+                                            <p:txEl>
+                                              <p:pRg st="2" end="2"/>
+                                            </p:txEl>
+                                          </p:spTgt>
+                                        </p:tgtEl>
+                                        <p:attrNameLst>
+                                          <p:attrName>style.rotation</p:attrName>
+                                        </p:attrNameLst>
+                                      </p:cBhvr>
+                                      <p:tavLst>
+                                        <p:tav tm="0">
+                                          <p:val>
+                                            <p:fltVal val="90"/>
+                                          </p:val>
+                                        </p:tav>
+                                        <p:tav tm="100000">
+                                          <p:val>
+                                            <p:fltVal val="0"/>
+                                          </p:val>
+                                        </p:tav>
+                                      </p:tavLst>
+                                    </p:anim>
+                                    <p:animEffect transition="in" filter="fade">
+                                      <p:cBhvr>
+                                        <p:cTn id="18" dur="1000"/>
+                                        <p:tgtEl>
+                                          <p:spTgt spid="3">
+                                            <p:txEl>
+                                              <p:pRg st="2" end="2"/>
+                                            </p:txEl>
+                                          </p:spTgt>
+                                        </p:tgtEl>
+                                      </p:cBhvr>
+                                    </p:animEffect>
+                                  </p:childTnLst>
+                                </p:cTn>
+                              </p:par>
+                            </p:childTnLst>
+                          </p:cTn>
+                        </p:par>
+                      </p:childTnLst>
+                    </p:cTn>
+                  </p:par>
+                  <p:par>
+                    <p:cTn id="19" fill="hold">
+                      <p:stCondLst>
+                        <p:cond delay="indefinite"/>
+                      </p:stCondLst>
+                      <p:childTnLst>
+                        <p:par>
+                          <p:cTn id="20" fill="hold">
+                            <p:stCondLst>
+                              <p:cond delay="0"/>
+                            </p:stCondLst>
+                            <p:childTnLst>
+                              <p:par>
+                                <p:cTn id="21" presetID="31" presetClass="entr" presetSubtype="0" fill="hold" nodeType="clickEffect">
+                                  <p:stCondLst>
+                                    <p:cond delay="0"/>
+                                  </p:stCondLst>
+                                  <p:childTnLst>
+                                    <p:set>
+                                      <p:cBhvr>
+                                        <p:cTn id="22" dur="1" fill="hold">
+                                          <p:stCondLst>
+                                            <p:cond delay="0"/>
+                                          </p:stCondLst>
+                                        </p:cTn>
+                                        <p:tgtEl>
+                                          <p:spTgt spid="3">
+                                            <p:txEl>
+                                              <p:pRg st="4" end="4"/>
+                                            </p:txEl>
+                                          </p:spTgt>
+                                        </p:tgtEl>
+                                        <p:attrNameLst>
+                                          <p:attrName>style.visibility</p:attrName>
+                                        </p:attrNameLst>
+                                      </p:cBhvr>
+                                      <p:to>
+                                        <p:strVal val="visible"/>
+                                      </p:to>
+                                    </p:set>
+                                    <p:anim calcmode="lin" valueType="num">
+                                      <p:cBhvr>
+                                        <p:cTn id="23" dur="1000" fill="hold"/>
+                                        <p:tgtEl>
+                                          <p:spTgt spid="3">
+                                            <p:txEl>
+                                              <p:pRg st="4" end="4"/>
+                                            </p:txEl>
+                                          </p:spTgt>
+                                        </p:tgtEl>
+                                        <p:attrNameLst>
+                                          <p:attrName>ppt_w</p:attrName>
+                                        </p:attrNameLst>
+                                      </p:cBhvr>
+                                      <p:tavLst>
+                                        <p:tav tm="0">
+                                          <p:val>
+                                            <p:fltVal val="0"/>
+                                          </p:val>
+                                        </p:tav>
+                                        <p:tav tm="100000">
+                                          <p:val>
+                                            <p:strVal val="#ppt_w"/>
+                                          </p:val>
+                                        </p:tav>
+                                      </p:tavLst>
+                                    </p:anim>
+                                    <p:anim calcmode="lin" valueType="num">
+                                      <p:cBhvr>
+                                        <p:cTn id="24" dur="1000" fill="hold"/>
+                                        <p:tgtEl>
+                                          <p:spTgt spid="3">
+                                            <p:txEl>
+                                              <p:pRg st="4" end="4"/>
+                                            </p:txEl>
+                                          </p:spTgt>
+                                        </p:tgtEl>
+                                        <p:attrNameLst>
+                                          <p:attrName>ppt_h</p:attrName>
+                                        </p:attrNameLst>
+                                      </p:cBhvr>
+                                      <p:tavLst>
+                                        <p:tav tm="0">
+                                          <p:val>
+                                            <p:fltVal val="0"/>
+                                          </p:val>
+                                        </p:tav>
+                                        <p:tav tm="100000">
+                                          <p:val>
+                                            <p:strVal val="#ppt_h"/>
+                                          </p:val>
+                                        </p:tav>
+                                      </p:tavLst>
+                                    </p:anim>
+                                    <p:anim calcmode="lin" valueType="num">
+                                      <p:cBhvr>
+                                        <p:cTn id="25" dur="1000" fill="hold"/>
+                                        <p:tgtEl>
+                                          <p:spTgt spid="3">
+                                            <p:txEl>
+                                              <p:pRg st="4" end="4"/>
+                                            </p:txEl>
+                                          </p:spTgt>
+                                        </p:tgtEl>
+                                        <p:attrNameLst>
+                                          <p:attrName>style.rotation</p:attrName>
+                                        </p:attrNameLst>
+                                      </p:cBhvr>
+                                      <p:tavLst>
+                                        <p:tav tm="0">
+                                          <p:val>
+                                            <p:fltVal val="90"/>
+                                          </p:val>
+                                        </p:tav>
+                                        <p:tav tm="100000">
+                                          <p:val>
+                                            <p:fltVal val="0"/>
+                                          </p:val>
+                                        </p:tav>
+                                      </p:tavLst>
+                                    </p:anim>
+                                    <p:animEffect transition="in" filter="fade">
+                                      <p:cBhvr>
+                                        <p:cTn id="26" dur="1000"/>
+                                        <p:tgtEl>
+                                          <p:spTgt spid="3">
+                                            <p:txEl>
+                                              <p:pRg st="4" end="4"/>
+                                            </p:txEl>
+                                          </p:spTgt>
+                                        </p:tgtEl>
+                                      </p:cBhvr>
+                                    </p:animEffect>
+                                  </p:childTnLst>
+                                </p:cTn>
+                              </p:par>
+                            </p:childTnLst>
+                          </p:cTn>
+                        </p:par>
+                      </p:childTnLst>
+                    </p:cTn>
+                  </p:par>
+                  <p:par>
+                    <p:cTn id="27" fill="hold">
+                      <p:stCondLst>
+                        <p:cond delay="indefinite"/>
+                      </p:stCondLst>
+                      <p:childTnLst>
+                        <p:par>
+                          <p:cTn id="28" fill="hold">
+                            <p:stCondLst>
+                              <p:cond delay="0"/>
+                            </p:stCondLst>
+                            <p:childTnLst>
+                              <p:par>
+                                <p:cTn id="29" presetID="26" presetClass="entr" presetSubtype="0" fill="hold" nodeType="clickEffect">
+                                  <p:stCondLst>
+                                    <p:cond delay="0"/>
+                                  </p:stCondLst>
+                                  <p:childTnLst>
+                                    <p:set>
+                                      <p:cBhvr>
+                                        <p:cTn id="30" dur="1" fill="hold">
+                                          <p:stCondLst>
+                                            <p:cond delay="0"/>
+                                          </p:stCondLst>
+                                        </p:cTn>
+                                        <p:tgtEl>
+                                          <p:spTgt spid="4"/>
+                                        </p:tgtEl>
+                                        <p:attrNameLst>
+                                          <p:attrName>style.visibility</p:attrName>
+                                        </p:attrNameLst>
+                                      </p:cBhvr>
+                                      <p:to>
+                                        <p:strVal val="visible"/>
+                                      </p:to>
+                                    </p:set>
+                                    <p:animEffect transition="in" filter="wipe(down)">
+                                      <p:cBhvr>
+                                        <p:cTn id="31" dur="580">
+                                          <p:stCondLst>
+                                            <p:cond delay="0"/>
+                                          </p:stCondLst>
+                                        </p:cTn>
+                                        <p:tgtEl>
+                                          <p:spTgt spid="4"/>
+                                        </p:tgtEl>
+                                      </p:cBhvr>
+                                    </p:animEffect>
+                                    <p:anim calcmode="lin" valueType="num">
+                                      <p:cBhvr>
+                                        <p:cTn id="32" dur="1822" tmFilter="0,0; 0.14,0.36; 0.43,0.73; 0.71,0.91; 1.0,1.0">
+                                          <p:stCondLst>
+                                            <p:cond delay="0"/>
+                                          </p:stCondLst>
+                                        </p:cTn>
+                                        <p:tgtEl>
+                                          <p:spTgt spid="4"/>
+                                        </p:tgtEl>
+                                        <p:attrNameLst>
+                                          <p:attrName>ppt_x</p:attrName>
+                                        </p:attrNameLst>
+                                      </p:cBhvr>
+                                      <p:tavLst>
+                                        <p:tav tm="0">
+                                          <p:val>
+                                            <p:strVal val="#ppt_x-0.25"/>
+                                          </p:val>
+                                        </p:tav>
+                                        <p:tav tm="100000">
+                                          <p:val>
+                                            <p:strVal val="#ppt_x"/>
+                                          </p:val>
+                                        </p:tav>
+                                      </p:tavLst>
+                                    </p:anim>
+                                    <p:anim calcmode="lin" valueType="num">
+                                      <p:cBhvr>
+                                        <p:cTn id="33" dur="664" tmFilter="0.0,0.0; 0.25,0.07; 0.50,0.2; 0.75,0.467; 1.0,1.0">
+                                          <p:stCondLst>
+                                            <p:cond delay="0"/>
+                                          </p:stCondLst>
+                                        </p:cTn>
+                                        <p:tgtEl>
+                                          <p:spTgt spid="4"/>
+                                        </p:tgtEl>
+                                        <p:attrNameLst>
+                                          <p:attrName>ppt_y</p:attrName>
+                                        </p:attrNameLst>
+                                      </p:cBhvr>
+                                      <p:tavLst>
+                                        <p:tav tm="0" fmla="#ppt_y-sin(pi*$)/3">
+                                          <p:val>
+                                            <p:fltVal val="0.5"/>
+                                          </p:val>
+                                        </p:tav>
+                                        <p:tav tm="100000">
+                                          <p:val>
+                                            <p:fltVal val="1"/>
+                                          </p:val>
+                                        </p:tav>
+                                      </p:tavLst>
+                                    </p:anim>
+                                    <p:anim calcmode="lin" valueType="num">
+                                      <p:cBhvr>
+                                        <p:cTn id="34" dur="664" tmFilter="0, 0; 0.125,0.2665; 0.25,0.4; 0.375,0.465; 0.5,0.5;  0.625,0.535; 0.75,0.6; 0.875,0.7335; 1,1">
+                                          <p:stCondLst>
+                                            <p:cond delay="664"/>
+                                          </p:stCondLst>
+                                        </p:cTn>
+                                        <p:tgtEl>
+                                          <p:spTgt spid="4"/>
+                                        </p:tgtEl>
+                                        <p:attrNameLst>
+                                          <p:attrName>ppt_y</p:attrName>
+                                        </p:attrNameLst>
+                                      </p:cBhvr>
+                                      <p:tavLst>
+                                        <p:tav tm="0" fmla="#ppt_y-sin(pi*$)/9">
+                                          <p:val>
+                                            <p:fltVal val="0"/>
+                                          </p:val>
+                                        </p:tav>
+                                        <p:tav tm="100000">
+                                          <p:val>
+                                            <p:fltVal val="1"/>
+                                          </p:val>
+                                        </p:tav>
+                                      </p:tavLst>
+                                    </p:anim>
+                                    <p:anim calcmode="lin" valueType="num">
+                                      <p:cBhvr>
+                                        <p:cTn id="35" dur="332" tmFilter="0, 0; 0.125,0.2665; 0.25,0.4; 0.375,0.465; 0.5,0.5;  0.625,0.535; 0.75,0.6; 0.875,0.7335; 1,1">
+                                          <p:stCondLst>
+                                            <p:cond delay="1324"/>
+                                          </p:stCondLst>
+                                        </p:cTn>
+                                        <p:tgtEl>
+                                          <p:spTgt spid="4"/>
+                                        </p:tgtEl>
+                                        <p:attrNameLst>
+                                          <p:attrName>ppt_y</p:attrName>
+                                        </p:attrNameLst>
+                                      </p:cBhvr>
+                                      <p:tavLst>
+                                        <p:tav tm="0" fmla="#ppt_y-sin(pi*$)/27">
+                                          <p:val>
+                                            <p:fltVal val="0"/>
+                                          </p:val>
+                                        </p:tav>
+                                        <p:tav tm="100000">
+                                          <p:val>
+                                            <p:fltVal val="1"/>
+                                          </p:val>
+                                        </p:tav>
+                                      </p:tavLst>
+                                    </p:anim>
+                                    <p:anim calcmode="lin" valueType="num">
+                                      <p:cBhvr>
+                                        <p:cTn id="36" dur="164" tmFilter="0, 0; 0.125,0.2665; 0.25,0.4; 0.375,0.465; 0.5,0.5;  0.625,0.535; 0.75,0.6; 0.875,0.7335; 1,1">
+                                          <p:stCondLst>
+                                            <p:cond delay="1656"/>
+                                          </p:stCondLst>
+                                        </p:cTn>
+                                        <p:tgtEl>
+                                          <p:spTgt spid="4"/>
+                                        </p:tgtEl>
+                                        <p:attrNameLst>
+                                          <p:attrName>ppt_y</p:attrName>
+                                        </p:attrNameLst>
+                                      </p:cBhvr>
+                                      <p:tavLst>
+                                        <p:tav tm="0" fmla="#ppt_y-sin(pi*$)/81">
+                                          <p:val>
+                                            <p:fltVal val="0"/>
+                                          </p:val>
+                                        </p:tav>
+                                        <p:tav tm="100000">
+                                          <p:val>
+                                            <p:fltVal val="1"/>
+                                          </p:val>
+                                        </p:tav>
+                                      </p:tavLst>
+                                    </p:anim>
+                                    <p:animScale>
+                                      <p:cBhvr>
+                                        <p:cTn id="37" dur="26">
+                                          <p:stCondLst>
+                                            <p:cond delay="650"/>
+                                          </p:stCondLst>
+                                        </p:cTn>
+                                        <p:tgtEl>
+                                          <p:spTgt spid="4"/>
+                                        </p:tgtEl>
+                                      </p:cBhvr>
+                                      <p:to x="100000" y="60000"/>
+                                    </p:animScale>
+                                    <p:animScale>
+                                      <p:cBhvr>
+                                        <p:cTn id="38" dur="166" decel="50000">
+                                          <p:stCondLst>
+                                            <p:cond delay="676"/>
+                                          </p:stCondLst>
+                                        </p:cTn>
+                                        <p:tgtEl>
+                                          <p:spTgt spid="4"/>
+                                        </p:tgtEl>
+                                      </p:cBhvr>
+                                      <p:to x="100000" y="100000"/>
+                                    </p:animScale>
+                                    <p:animScale>
+                                      <p:cBhvr>
+                                        <p:cTn id="39" dur="26">
+                                          <p:stCondLst>
+                                            <p:cond delay="1312"/>
+                                          </p:stCondLst>
+                                        </p:cTn>
+                                        <p:tgtEl>
+                                          <p:spTgt spid="4"/>
+                                        </p:tgtEl>
+                                      </p:cBhvr>
+                                      <p:to x="100000" y="80000"/>
+                                    </p:animScale>
+                                    <p:animScale>
+                                      <p:cBhvr>
+                                        <p:cTn id="40" dur="166" decel="50000">
+                                          <p:stCondLst>
+                                            <p:cond delay="1338"/>
+                                          </p:stCondLst>
+                                        </p:cTn>
+                                        <p:tgtEl>
+                                          <p:spTgt spid="4"/>
+                                        </p:tgtEl>
+                                      </p:cBhvr>
+                                      <p:to x="100000" y="100000"/>
+                                    </p:animScale>
+                                    <p:animScale>
+                                      <p:cBhvr>
+                                        <p:cTn id="41" dur="26">
+                                          <p:stCondLst>
+                                            <p:cond delay="1642"/>
+                                          </p:stCondLst>
+                                        </p:cTn>
+                                        <p:tgtEl>
+                                          <p:spTgt spid="4"/>
+                                        </p:tgtEl>
+                                      </p:cBhvr>
+                                      <p:to x="100000" y="90000"/>
+                                    </p:animScale>
+                                    <p:animScale>
+                                      <p:cBhvr>
+                                        <p:cTn id="42" dur="166" decel="50000">
+                                          <p:stCondLst>
+                                            <p:cond delay="1668"/>
+                                          </p:stCondLst>
+                                        </p:cTn>
+                                        <p:tgtEl>
+                                          <p:spTgt spid="4"/>
+                                        </p:tgtEl>
+                                      </p:cBhvr>
+                                      <p:to x="100000" y="100000"/>
+                                    </p:animScale>
+                                    <p:animScale>
+                                      <p:cBhvr>
+                                        <p:cTn id="43" dur="26">
+                                          <p:stCondLst>
+                                            <p:cond delay="1808"/>
+                                          </p:stCondLst>
+                                        </p:cTn>
+                                        <p:tgtEl>
+                                          <p:spTgt spid="4"/>
+                                        </p:tgtEl>
+                                      </p:cBhvr>
+                                      <p:to x="100000" y="95000"/>
+                                    </p:animScale>
+                                    <p:animScale>
+                                      <p:cBhvr>
+                                        <p:cTn id="44" dur="166" decel="50000">
+                                          <p:stCondLst>
+                                            <p:cond delay="1834"/>
+                                          </p:stCondLst>
+                                        </p:cTn>
+                                        <p:tgtEl>
+                                          <p:spTgt spid="4"/>
+                                        </p:tgtEl>
+                                      </p:cBhvr>
+                                      <p:to x="100000" y="100000"/>
+                                    </p:animScale>
+                                  </p:childTnLst>
+                                </p:cTn>
+                              </p:par>
+                            </p:childTnLst>
+                          </p:cTn>
+                        </p:par>
+                      </p:childTnLst>
+                    </p:cTn>
+                  </p:par>
+                </p:childTnLst>
+              </p:cTn>
+              <p:prevCondLst>
+                <p:cond evt="onPrev" delay="0">
+                  <p:tgtEl>
+                    <p:sldTgt/>
+                  </p:tgtEl>
+                </p:cond>
+              </p:prevCondLst>
+              <p:nextCondLst>
+                <p:cond evt="onNext" delay="0">
+                  <p:tgtEl>
+                    <p:sldTgt/>
+                  </p:tgtEl>
+                </p:cond>
+              </p:nextCondLst>
+            </p:seq>
+          </p:childTnLst>
+        </p:cTn>
       </p:par>
     </p:tnLst>
   </p:timing>
@@ -4509,8 +5263,8 @@
         </p:nvSpPr>
         <p:spPr>
           <a:xfrm>
-            <a:off x="249072" y="228600"/>
-            <a:ext cx="4267200" cy="609600"/>
+            <a:off x="234287" y="228600"/>
+            <a:ext cx="3042313" cy="381000"/>
           </a:xfrm>
         </p:spPr>
         <p:style>
@@ -4531,29 +5285,29 @@
         </p:style>
         <p:txBody>
           <a:bodyPr>
-            <a:normAutofit/>
+            <a:normAutofit fontScale="90000"/>
           </a:bodyPr>
           <a:lstStyle/>
           <a:p>
             <a:r>
-              <a:rPr lang="en-US" sz="3200" dirty="0" err="1" smtClean="0">
-                <a:solidFill>
-                  <a:srgbClr val="00B0F0"/>
+              <a:rPr lang="en-US" sz="2400" b="1" dirty="0" err="1" smtClean="0">
+                <a:solidFill>
+                  <a:srgbClr val="FFFF00"/>
                 </a:solidFill>
               </a:rPr>
               <a:t>Tehnologii</a:t>
             </a:r>
             <a:r>
-              <a:rPr lang="en-US" sz="3200" dirty="0" smtClean="0">
-                <a:solidFill>
-                  <a:srgbClr val="00B0F0"/>
+              <a:rPr lang="en-US" sz="2400" b="1" dirty="0" smtClean="0">
+                <a:solidFill>
+                  <a:srgbClr val="FFFF00"/>
                 </a:solidFill>
               </a:rPr>
               <a:t> utilizate</a:t>
             </a:r>
-            <a:endParaRPr lang="en-US" sz="3200" dirty="0">
+            <a:endParaRPr lang="en-US" sz="2400" b="1" dirty="0">
               <a:solidFill>
-                <a:srgbClr val="00B0F0"/>
+                <a:srgbClr val="FFFF00"/>
               </a:solidFill>
             </a:endParaRPr>
           </a:p>
@@ -4571,8 +5325,8 @@
         </p:nvSpPr>
         <p:spPr>
           <a:xfrm>
-            <a:off x="2667000" y="1052946"/>
-            <a:ext cx="6324600" cy="2895600"/>
+            <a:off x="4038600" y="533400"/>
+            <a:ext cx="4953000" cy="4800600"/>
           </a:xfrm>
         </p:spPr>
         <p:style>
@@ -4591,117 +5345,117 @@
         </p:style>
         <p:txBody>
           <a:bodyPr>
-            <a:normAutofit lnSpcReduction="10000"/>
+            <a:normAutofit/>
           </a:bodyPr>
           <a:lstStyle/>
           <a:p>
-            <a:pPr>
+            <a:pPr algn="just">
               <a:buFont typeface="Wingdings" pitchFamily="2" charset="2"/>
               <a:buChar char="§"/>
             </a:pPr>
             <a:r>
-              <a:rPr lang="en-US" sz="1800" dirty="0" err="1" smtClean="0">
-                <a:solidFill>
-                  <a:srgbClr val="FFC000"/>
+              <a:rPr lang="en-US" sz="1800" b="1" dirty="0" err="1" smtClean="0">
+                <a:solidFill>
+                  <a:srgbClr val="92D050"/>
                 </a:solidFill>
                 <a:latin typeface="+mj-lt"/>
               </a:rPr>
               <a:t>Folosirea</a:t>
             </a:r>
             <a:r>
-              <a:rPr lang="en-US" sz="1800" dirty="0" smtClean="0">
-                <a:solidFill>
-                  <a:srgbClr val="FFC000"/>
+              <a:rPr lang="en-US" sz="1800" b="1" dirty="0" smtClean="0">
+                <a:solidFill>
+                  <a:srgbClr val="92D050"/>
                 </a:solidFill>
                 <a:latin typeface="+mj-lt"/>
               </a:rPr>
               <a:t> </a:t>
             </a:r>
             <a:r>
-              <a:rPr lang="en-US" sz="1800" dirty="0" err="1" smtClean="0">
-                <a:solidFill>
-                  <a:srgbClr val="FFC000"/>
+              <a:rPr lang="en-US" sz="1800" b="1" dirty="0" err="1" smtClean="0">
+                <a:solidFill>
+                  <a:srgbClr val="92D050"/>
                 </a:solidFill>
                 <a:latin typeface="+mj-lt"/>
               </a:rPr>
               <a:t>limbajului</a:t>
             </a:r>
             <a:r>
-              <a:rPr lang="en-US" sz="1800" dirty="0" smtClean="0">
-                <a:solidFill>
-                  <a:srgbClr val="FFC000"/>
+              <a:rPr lang="en-US" sz="1800" b="1" dirty="0" smtClean="0">
+                <a:solidFill>
+                  <a:srgbClr val="92D050"/>
                 </a:solidFill>
                 <a:latin typeface="+mj-lt"/>
               </a:rPr>
               <a:t> de </a:t>
             </a:r>
             <a:r>
-              <a:rPr lang="en-US" sz="1800" dirty="0" err="1" smtClean="0">
-                <a:solidFill>
-                  <a:srgbClr val="FFC000"/>
+              <a:rPr lang="en-US" sz="1800" b="1" dirty="0" err="1" smtClean="0">
+                <a:solidFill>
+                  <a:srgbClr val="92D050"/>
                 </a:solidFill>
                 <a:latin typeface="+mj-lt"/>
               </a:rPr>
               <a:t>programare</a:t>
             </a:r>
             <a:r>
-              <a:rPr lang="en-US" sz="1800" dirty="0" smtClean="0">
-                <a:solidFill>
-                  <a:srgbClr val="FFC000"/>
+              <a:rPr lang="en-US" sz="1800" b="1" dirty="0" smtClean="0">
+                <a:solidFill>
+                  <a:srgbClr val="92D050"/>
                 </a:solidFill>
                 <a:latin typeface="+mj-lt"/>
               </a:rPr>
               <a:t> Java, </a:t>
             </a:r>
             <a:r>
-              <a:rPr lang="en-US" sz="1800" dirty="0" err="1" smtClean="0">
-                <a:solidFill>
-                  <a:srgbClr val="FFC000"/>
+              <a:rPr lang="en-US" sz="1800" b="1" dirty="0" err="1" smtClean="0">
+                <a:solidFill>
+                  <a:srgbClr val="92D050"/>
                 </a:solidFill>
                 <a:latin typeface="+mj-lt"/>
               </a:rPr>
               <a:t>mediul</a:t>
             </a:r>
             <a:r>
-              <a:rPr lang="en-US" sz="1800" dirty="0" smtClean="0">
-                <a:solidFill>
-                  <a:srgbClr val="FFC000"/>
+              <a:rPr lang="en-US" sz="1800" b="1" dirty="0" smtClean="0">
+                <a:solidFill>
+                  <a:srgbClr val="92D050"/>
                 </a:solidFill>
                 <a:latin typeface="+mj-lt"/>
               </a:rPr>
               <a:t> de </a:t>
             </a:r>
             <a:r>
-              <a:rPr lang="en-US" sz="1800" dirty="0" err="1" smtClean="0">
-                <a:solidFill>
-                  <a:srgbClr val="FFC000"/>
+              <a:rPr lang="en-US" sz="1800" b="1" dirty="0" err="1" smtClean="0">
+                <a:solidFill>
+                  <a:srgbClr val="92D050"/>
                 </a:solidFill>
                 <a:latin typeface="+mj-lt"/>
               </a:rPr>
               <a:t>dezvoltare</a:t>
             </a:r>
             <a:r>
-              <a:rPr lang="en-US" sz="1800" dirty="0" smtClean="0">
-                <a:solidFill>
-                  <a:srgbClr val="FFC000"/>
+              <a:rPr lang="en-US" sz="1800" b="1" dirty="0" smtClean="0">
+                <a:solidFill>
+                  <a:srgbClr val="92D050"/>
                 </a:solidFill>
                 <a:latin typeface="+mj-lt"/>
               </a:rPr>
               <a:t> este </a:t>
             </a:r>
             <a:r>
-              <a:rPr lang="en-US" sz="1800" dirty="0" err="1" smtClean="0">
-                <a:solidFill>
-                  <a:srgbClr val="FFC000"/>
+              <a:rPr lang="en-US" sz="1800" b="1" dirty="0" err="1" smtClean="0">
+                <a:solidFill>
+                  <a:srgbClr val="92D050"/>
                 </a:solidFill>
                 <a:latin typeface="+mj-lt"/>
               </a:rPr>
               <a:t>IntelliJ</a:t>
             </a:r>
             <a:r>
-              <a:rPr lang="en-US" sz="1800" dirty="0" smtClean="0">
-                <a:solidFill>
-                  <a:srgbClr val="FFC000"/>
+              <a:rPr lang="en-US" sz="1800" b="1" dirty="0" smtClean="0">
+                <a:solidFill>
+                  <a:srgbClr val="92D050"/>
                 </a:solidFill>
                 <a:latin typeface="+mj-lt"/>
               </a:rPr>
@@ -4709,61 +5463,61 @@
             </a:r>
           </a:p>
           <a:p>
-            <a:pPr marL="0" indent="0">
+            <a:pPr marL="0" indent="0" algn="just">
               <a:buNone/>
             </a:pPr>
-            <a:endParaRPr lang="en-US" sz="1800" dirty="0" smtClean="0">
+            <a:endParaRPr lang="en-US" sz="1800" b="1" dirty="0" smtClean="0">
               <a:solidFill>
-                <a:srgbClr val="FFC000"/>
+                <a:srgbClr val="92D050"/>
               </a:solidFill>
               <a:latin typeface="+mj-lt"/>
             </a:endParaRPr>
           </a:p>
           <a:p>
-            <a:pPr>
+            <a:pPr algn="just">
               <a:buFont typeface="Wingdings" pitchFamily="2" charset="2"/>
               <a:buChar char="§"/>
             </a:pPr>
             <a:r>
-              <a:rPr lang="en-US" sz="1800" dirty="0" smtClean="0">
-                <a:solidFill>
-                  <a:srgbClr val="FFC000"/>
+              <a:rPr lang="en-US" sz="1800" b="1" dirty="0" smtClean="0">
+                <a:solidFill>
+                  <a:srgbClr val="92D050"/>
                 </a:solidFill>
                 <a:latin typeface="+mj-lt"/>
               </a:rPr>
               <a:t>Aplicatia </a:t>
             </a:r>
             <a:r>
-              <a:rPr lang="en-US" sz="1800" dirty="0" err="1" smtClean="0">
-                <a:solidFill>
-                  <a:srgbClr val="FFC000"/>
+              <a:rPr lang="en-US" sz="1800" b="1" dirty="0" err="1" smtClean="0">
+                <a:solidFill>
+                  <a:srgbClr val="92D050"/>
                 </a:solidFill>
                 <a:latin typeface="+mj-lt"/>
               </a:rPr>
               <a:t>respecta</a:t>
             </a:r>
             <a:r>
-              <a:rPr lang="en-US" sz="1800" dirty="0" smtClean="0">
-                <a:solidFill>
-                  <a:srgbClr val="FFC000"/>
+              <a:rPr lang="en-US" sz="1800" b="1" dirty="0" smtClean="0">
+                <a:solidFill>
+                  <a:srgbClr val="92D050"/>
                 </a:solidFill>
                 <a:latin typeface="+mj-lt"/>
               </a:rPr>
               <a:t> </a:t>
             </a:r>
             <a:r>
-              <a:rPr lang="en-US" sz="1800" dirty="0" err="1" smtClean="0">
-                <a:solidFill>
-                  <a:srgbClr val="FFC000"/>
+              <a:rPr lang="en-US" sz="1800" b="1" dirty="0" err="1" smtClean="0">
+                <a:solidFill>
+                  <a:srgbClr val="92D050"/>
                 </a:solidFill>
                 <a:latin typeface="+mj-lt"/>
               </a:rPr>
               <a:t>modelul</a:t>
             </a:r>
             <a:r>
-              <a:rPr lang="en-US" sz="1800" dirty="0" smtClean="0">
-                <a:solidFill>
-                  <a:srgbClr val="FFC000"/>
+              <a:rPr lang="en-US" sz="1800" b="1" dirty="0" smtClean="0">
+                <a:solidFill>
+                  <a:srgbClr val="92D050"/>
                 </a:solidFill>
                 <a:latin typeface="+mj-lt"/>
               </a:rPr>
@@ -4771,43 +5525,43 @@
             </a:r>
           </a:p>
           <a:p>
-            <a:pPr marL="0" indent="0">
+            <a:pPr marL="0" indent="0" algn="just">
               <a:buNone/>
             </a:pPr>
-            <a:endParaRPr lang="en-US" sz="1800" dirty="0" smtClean="0">
+            <a:endParaRPr lang="en-US" sz="1800" b="1" dirty="0" smtClean="0">
               <a:solidFill>
-                <a:srgbClr val="FFC000"/>
+                <a:srgbClr val="92D050"/>
               </a:solidFill>
               <a:latin typeface="+mj-lt"/>
             </a:endParaRPr>
           </a:p>
           <a:p>
-            <a:pPr marL="457200" indent="-457200" algn="r">
+            <a:pPr marL="457200" indent="-457200" algn="just">
               <a:buFont typeface="+mj-lt"/>
               <a:buAutoNum type="arabicPeriod"/>
             </a:pPr>
             <a:r>
-              <a:rPr lang="en-US" sz="1800" dirty="0" smtClean="0">
-                <a:solidFill>
-                  <a:srgbClr val="FFC000"/>
+              <a:rPr lang="en-US" sz="1800" b="1" dirty="0" smtClean="0">
+                <a:solidFill>
+                  <a:srgbClr val="92D050"/>
                 </a:solidFill>
                 <a:latin typeface="+mj-lt"/>
               </a:rPr>
               <a:t>Partea de model este </a:t>
             </a:r>
             <a:r>
-              <a:rPr lang="en-US" sz="1800" dirty="0" err="1" smtClean="0">
-                <a:solidFill>
-                  <a:srgbClr val="FFC000"/>
+              <a:rPr lang="en-US" sz="1800" b="1" dirty="0" err="1" smtClean="0">
+                <a:solidFill>
+                  <a:srgbClr val="92D050"/>
                 </a:solidFill>
                 <a:latin typeface="+mj-lt"/>
               </a:rPr>
               <a:t>asigurata</a:t>
             </a:r>
             <a:r>
-              <a:rPr lang="en-US" sz="1800" dirty="0" smtClean="0">
-                <a:solidFill>
-                  <a:srgbClr val="FFC000"/>
+              <a:rPr lang="en-US" sz="1800" b="1" dirty="0" smtClean="0">
+                <a:solidFill>
+                  <a:srgbClr val="92D050"/>
                 </a:solidFill>
                 <a:latin typeface="+mj-lt"/>
               </a:rPr>
@@ -4815,32 +5569,32 @@
             </a:r>
           </a:p>
           <a:p>
-            <a:pPr marL="457200" indent="-457200" algn="r">
+            <a:pPr marL="457200" indent="-457200" algn="just">
               <a:buFont typeface="+mj-lt"/>
               <a:buAutoNum type="arabicPeriod"/>
             </a:pPr>
             <a:r>
-              <a:rPr lang="en-US" sz="1800" dirty="0" smtClean="0">
-                <a:solidFill>
-                  <a:srgbClr val="FFC000"/>
+              <a:rPr lang="en-US" sz="1800" b="1" dirty="0" smtClean="0">
+                <a:solidFill>
+                  <a:srgbClr val="92D050"/>
                 </a:solidFill>
                 <a:latin typeface="+mj-lt"/>
               </a:rPr>
               <a:t>Partea de view este </a:t>
             </a:r>
             <a:r>
-              <a:rPr lang="en-US" sz="1800" dirty="0" err="1" smtClean="0">
-                <a:solidFill>
-                  <a:srgbClr val="FFC000"/>
+              <a:rPr lang="en-US" sz="1800" b="1" dirty="0" err="1" smtClean="0">
+                <a:solidFill>
+                  <a:srgbClr val="92D050"/>
                 </a:solidFill>
                 <a:latin typeface="+mj-lt"/>
               </a:rPr>
               <a:t>realizata</a:t>
             </a:r>
             <a:r>
-              <a:rPr lang="en-US" sz="1800" dirty="0" smtClean="0">
-                <a:solidFill>
-                  <a:srgbClr val="FFC000"/>
+              <a:rPr lang="en-US" sz="1800" b="1" dirty="0" smtClean="0">
+                <a:solidFill>
+                  <a:srgbClr val="92D050"/>
                 </a:solidFill>
                 <a:latin typeface="+mj-lt"/>
               </a:rPr>
@@ -4848,40 +5602,40 @@
             </a:r>
           </a:p>
           <a:p>
-            <a:pPr marL="457200" indent="-457200" algn="r">
+            <a:pPr marL="457200" indent="-457200" algn="just">
               <a:buFont typeface="+mj-lt"/>
               <a:buAutoNum type="arabicPeriod"/>
             </a:pPr>
             <a:r>
-              <a:rPr lang="en-US" sz="1800" dirty="0" smtClean="0">
-                <a:solidFill>
-                  <a:srgbClr val="FFC000"/>
+              <a:rPr lang="en-US" sz="1800" b="1" dirty="0" smtClean="0">
+                <a:solidFill>
+                  <a:srgbClr val="92D050"/>
                 </a:solidFill>
                 <a:latin typeface="+mj-lt"/>
               </a:rPr>
               <a:t>Partea de controller este data de </a:t>
             </a:r>
             <a:r>
-              <a:rPr lang="en-US" sz="1800" dirty="0" err="1" smtClean="0">
-                <a:solidFill>
-                  <a:srgbClr val="FFC000"/>
+              <a:rPr lang="en-US" sz="1800" b="1" dirty="0" err="1" smtClean="0">
+                <a:solidFill>
+                  <a:srgbClr val="92D050"/>
                 </a:solidFill>
                 <a:latin typeface="+mj-lt"/>
               </a:rPr>
               <a:t>logica</a:t>
             </a:r>
             <a:r>
-              <a:rPr lang="en-US" sz="1800" dirty="0" smtClean="0">
-                <a:solidFill>
-                  <a:srgbClr val="FFC000"/>
+              <a:rPr lang="en-US" sz="1800" b="1" dirty="0" smtClean="0">
+                <a:solidFill>
+                  <a:srgbClr val="92D050"/>
                 </a:solidFill>
                 <a:latin typeface="+mj-lt"/>
               </a:rPr>
               <a:t> aplicatiei. </a:t>
             </a:r>
-            <a:endParaRPr lang="en-US" sz="1800" dirty="0">
+            <a:endParaRPr lang="en-US" sz="1800" b="1" dirty="0">
               <a:solidFill>
-                <a:srgbClr val="FFC000"/>
+                <a:srgbClr val="92D050"/>
               </a:solidFill>
               <a:latin typeface="+mj-lt"/>
             </a:endParaRPr>
@@ -4910,8 +5664,8 @@
         </p:blipFill>
         <p:spPr>
           <a:xfrm>
-            <a:off x="685800" y="4648200"/>
-            <a:ext cx="4343400" cy="1991046"/>
+            <a:off x="202442" y="3733800"/>
+            <a:ext cx="3657600" cy="1794140"/>
           </a:xfrm>
           <a:prstGeom prst="rect">
             <a:avLst/>
@@ -4955,8 +5709,8 @@
         </p:blipFill>
         <p:spPr bwMode="auto">
           <a:xfrm>
-            <a:off x="228600" y="2057400"/>
-            <a:ext cx="1086703" cy="662796"/>
+            <a:off x="337782" y="1295400"/>
+            <a:ext cx="1211639" cy="738996"/>
           </a:xfrm>
           <a:prstGeom prst="rect">
             <a:avLst/>
@@ -5019,8 +5773,8 @@
         </p:blipFill>
         <p:spPr bwMode="auto">
           <a:xfrm>
-            <a:off x="1447800" y="1219200"/>
-            <a:ext cx="685800" cy="685800"/>
+            <a:off x="2608996" y="941127"/>
+            <a:ext cx="820003" cy="820003"/>
           </a:xfrm>
           <a:prstGeom prst="rect">
             <a:avLst/>
@@ -5083,8 +5837,8 @@
         </p:blipFill>
         <p:spPr bwMode="auto">
           <a:xfrm>
-            <a:off x="1143000" y="3048000"/>
-            <a:ext cx="762000" cy="900546"/>
+            <a:off x="1714500" y="2205614"/>
+            <a:ext cx="894496" cy="1057132"/>
           </a:xfrm>
           <a:prstGeom prst="rect">
             <a:avLst/>
@@ -5654,8 +6408,8 @@
         </p:nvSpPr>
         <p:spPr>
           <a:xfrm>
-            <a:off x="457200" y="152400"/>
-            <a:ext cx="5410200" cy="1143000"/>
+            <a:off x="238978" y="152400"/>
+            <a:ext cx="4551812" cy="609600"/>
           </a:xfrm>
         </p:spPr>
         <p:style>
@@ -5679,14 +6433,26 @@
           <a:lstStyle/>
           <a:p>
             <a:r>
-              <a:rPr lang="en-US" dirty="0" err="1" smtClean="0"/>
+              <a:rPr lang="en-US" b="1" dirty="0" err="1" smtClean="0">
+                <a:solidFill>
+                  <a:srgbClr val="FFC000"/>
+                </a:solidFill>
+              </a:rPr>
               <a:t>Arhitectura</a:t>
             </a:r>
             <a:r>
-              <a:rPr lang="en-US" dirty="0" smtClean="0"/>
+              <a:rPr lang="en-US" b="1" dirty="0" smtClean="0">
+                <a:solidFill>
+                  <a:srgbClr val="FFC000"/>
+                </a:solidFill>
+              </a:rPr>
               <a:t> software</a:t>
             </a:r>
-            <a:endParaRPr lang="en-US" dirty="0"/>
+            <a:endParaRPr lang="en-US" b="1" dirty="0">
+              <a:solidFill>
+                <a:srgbClr val="FFC000"/>
+              </a:solidFill>
+            </a:endParaRPr>
           </a:p>
         </p:txBody>
       </p:sp>
@@ -5698,7 +6464,7 @@
         </p:nvSpPr>
         <p:spPr>
           <a:xfrm>
-            <a:off x="3193576" y="2019300"/>
+            <a:off x="2025839" y="2411893"/>
             <a:ext cx="1066800" cy="381000"/>
           </a:xfrm>
           <a:prstGeom prst="rect">
@@ -5748,7 +6514,7 @@
         </p:nvSpPr>
         <p:spPr>
           <a:xfrm>
-            <a:off x="1371600" y="3276600"/>
+            <a:off x="203863" y="3669193"/>
             <a:ext cx="1066800" cy="371901"/>
           </a:xfrm>
           <a:prstGeom prst="rect">
@@ -5798,7 +6564,7 @@
         </p:nvSpPr>
         <p:spPr>
           <a:xfrm>
-            <a:off x="4953000" y="3387485"/>
+            <a:off x="3785263" y="3780078"/>
             <a:ext cx="1268104" cy="388960"/>
           </a:xfrm>
           <a:prstGeom prst="rect">
@@ -5848,7 +6614,7 @@
         </p:nvSpPr>
         <p:spPr>
           <a:xfrm>
-            <a:off x="3182202" y="4724400"/>
+            <a:off x="2014465" y="5116993"/>
             <a:ext cx="1078173" cy="381000"/>
           </a:xfrm>
           <a:prstGeom prst="rect">
@@ -5900,7 +6666,7 @@
         </p:nvCxnSpPr>
         <p:spPr>
           <a:xfrm flipH="1" flipV="1">
-            <a:off x="4260376" y="2209800"/>
+            <a:off x="3092639" y="2602393"/>
             <a:ext cx="1357383" cy="1177685"/>
           </a:xfrm>
           <a:prstGeom prst="straightConnector1">
@@ -5939,7 +6705,7 @@
         </p:nvCxnSpPr>
         <p:spPr>
           <a:xfrm flipH="1">
-            <a:off x="1905000" y="2209800"/>
+            <a:off x="737263" y="2602393"/>
             <a:ext cx="1288576" cy="1066800"/>
           </a:xfrm>
           <a:prstGeom prst="straightConnector1">
@@ -5977,7 +6743,7 @@
         </p:nvCxnSpPr>
         <p:spPr>
           <a:xfrm>
-            <a:off x="1905000" y="3733800"/>
+            <a:off x="737263" y="4126393"/>
             <a:ext cx="1277202" cy="1181100"/>
           </a:xfrm>
           <a:prstGeom prst="straightConnector1">
@@ -6015,7 +6781,7 @@
         </p:nvCxnSpPr>
         <p:spPr>
           <a:xfrm flipV="1">
-            <a:off x="4260375" y="3776445"/>
+            <a:off x="3092638" y="4169038"/>
             <a:ext cx="1289146" cy="1138455"/>
           </a:xfrm>
           <a:prstGeom prst="straightConnector1">
@@ -6051,7 +6817,7 @@
         </p:nvSpPr>
         <p:spPr>
           <a:xfrm>
-            <a:off x="4648200" y="2719445"/>
+            <a:off x="3480463" y="3112038"/>
             <a:ext cx="838200" cy="230832"/>
           </a:xfrm>
           <a:prstGeom prst="rect">
@@ -6105,7 +6871,7 @@
         </p:nvSpPr>
         <p:spPr>
           <a:xfrm>
-            <a:off x="2209800" y="2627784"/>
+            <a:off x="1042063" y="3020377"/>
             <a:ext cx="762000" cy="230832"/>
           </a:xfrm>
           <a:prstGeom prst="rect">
@@ -6159,7 +6925,7 @@
         </p:nvSpPr>
         <p:spPr>
           <a:xfrm>
-            <a:off x="4577117" y="4230256"/>
+            <a:off x="3409380" y="4622849"/>
             <a:ext cx="723900" cy="230832"/>
           </a:xfrm>
           <a:prstGeom prst="rect">
@@ -6213,7 +6979,7 @@
         </p:nvSpPr>
         <p:spPr>
           <a:xfrm>
-            <a:off x="2108010" y="4208934"/>
+            <a:off x="940273" y="4601527"/>
             <a:ext cx="838200" cy="230832"/>
           </a:xfrm>
           <a:prstGeom prst="rect">
@@ -6259,6 +7025,205 @@
           </a:p>
         </p:txBody>
       </p:sp>
+      <p:sp>
+        <p:nvSpPr>
+          <p:cNvPr id="3" name="TextBox 2"/>
+          <p:cNvSpPr txBox="1"/>
+          <p:nvPr/>
+        </p:nvSpPr>
+        <p:spPr>
+          <a:xfrm>
+            <a:off x="4495800" y="1044315"/>
+            <a:ext cx="4419600" cy="1477328"/>
+          </a:xfrm>
+          <a:prstGeom prst="rect">
+            <a:avLst/>
+          </a:prstGeom>
+        </p:spPr>
+        <p:style>
+          <a:lnRef idx="2">
+            <a:schemeClr val="accent5">
+              <a:shade val="50000"/>
+            </a:schemeClr>
+          </a:lnRef>
+          <a:fillRef idx="1">
+            <a:schemeClr val="accent5"/>
+          </a:fillRef>
+          <a:effectRef idx="0">
+            <a:schemeClr val="accent5"/>
+          </a:effectRef>
+          <a:fontRef idx="minor">
+            <a:schemeClr val="lt1"/>
+          </a:fontRef>
+        </p:style>
+        <p:txBody>
+          <a:bodyPr wrap="square" rtlCol="0">
+            <a:spAutoFit/>
+          </a:bodyPr>
+          <a:lstStyle/>
+          <a:p>
+            <a:pPr algn="just"/>
+            <a:r>
+              <a:rPr lang="en-US" b="1" dirty="0" err="1" smtClean="0">
+                <a:solidFill>
+                  <a:srgbClr val="FFC000"/>
+                </a:solidFill>
+              </a:rPr>
+              <a:t>Pachetul</a:t>
+            </a:r>
+            <a:r>
+              <a:rPr lang="en-US" b="1" dirty="0" smtClean="0">
+                <a:solidFill>
+                  <a:srgbClr val="FFC000"/>
+                </a:solidFill>
+              </a:rPr>
+              <a:t> controller: </a:t>
+            </a:r>
+            <a:r>
+              <a:rPr lang="en-US" b="1" dirty="0" err="1" smtClean="0">
+                <a:solidFill>
+                  <a:srgbClr val="92D050"/>
+                </a:solidFill>
+              </a:rPr>
+              <a:t>MainForm</a:t>
+            </a:r>
+            <a:endParaRPr lang="en-US" b="1" dirty="0" smtClean="0">
+              <a:solidFill>
+                <a:srgbClr val="92D050"/>
+              </a:solidFill>
+            </a:endParaRPr>
+          </a:p>
+          <a:p>
+            <a:pPr algn="just"/>
+            <a:r>
+              <a:rPr lang="en-US" b="1" dirty="0" err="1" smtClean="0">
+                <a:solidFill>
+                  <a:srgbClr val="FFC000"/>
+                </a:solidFill>
+              </a:rPr>
+              <a:t>Pachetul</a:t>
+            </a:r>
+            <a:r>
+              <a:rPr lang="en-US" b="1" dirty="0" smtClean="0">
+                <a:solidFill>
+                  <a:srgbClr val="FFC000"/>
+                </a:solidFill>
+              </a:rPr>
+              <a:t> model: </a:t>
+            </a:r>
+            <a:r>
+              <a:rPr lang="en-US" b="1" dirty="0" smtClean="0">
+                <a:solidFill>
+                  <a:srgbClr val="92D050"/>
+                </a:solidFill>
+              </a:rPr>
+              <a:t>Data models</a:t>
+            </a:r>
+          </a:p>
+          <a:p>
+            <a:pPr algn="just"/>
+            <a:r>
+              <a:rPr lang="en-US" b="1" dirty="0" err="1" smtClean="0">
+                <a:solidFill>
+                  <a:srgbClr val="FFC000"/>
+                </a:solidFill>
+              </a:rPr>
+              <a:t>Pachetul</a:t>
+            </a:r>
+            <a:r>
+              <a:rPr lang="en-US" b="1" dirty="0" smtClean="0">
+                <a:solidFill>
+                  <a:srgbClr val="FFC000"/>
+                </a:solidFill>
+              </a:rPr>
+              <a:t> parser: </a:t>
+            </a:r>
+            <a:r>
+              <a:rPr lang="en-US" b="1" dirty="0" smtClean="0">
+                <a:solidFill>
+                  <a:srgbClr val="92D050"/>
+                </a:solidFill>
+              </a:rPr>
+              <a:t>Read and Write xml</a:t>
+            </a:r>
+          </a:p>
+          <a:p>
+            <a:pPr algn="just"/>
+            <a:r>
+              <a:rPr lang="en-US" b="1" dirty="0" err="1" smtClean="0">
+                <a:solidFill>
+                  <a:srgbClr val="FFC000"/>
+                </a:solidFill>
+              </a:rPr>
+              <a:t>Pachetul</a:t>
+            </a:r>
+            <a:r>
+              <a:rPr lang="en-US" b="1" dirty="0" smtClean="0">
+                <a:solidFill>
+                  <a:srgbClr val="FFC000"/>
+                </a:solidFill>
+              </a:rPr>
+              <a:t> view: </a:t>
+            </a:r>
+            <a:r>
+              <a:rPr lang="en-US" b="1" dirty="0" smtClean="0">
+                <a:solidFill>
+                  <a:srgbClr val="92D050"/>
+                </a:solidFill>
+              </a:rPr>
+              <a:t>Xml input and report generated</a:t>
+            </a:r>
+          </a:p>
+          <a:p>
+            <a:pPr algn="just"/>
+            <a:r>
+              <a:rPr lang="en-US" b="1" dirty="0" err="1" smtClean="0">
+                <a:solidFill>
+                  <a:srgbClr val="FFC000"/>
+                </a:solidFill>
+              </a:rPr>
+              <a:t>Pachetul</a:t>
+            </a:r>
+            <a:r>
+              <a:rPr lang="en-US" b="1" dirty="0" smtClean="0">
+                <a:solidFill>
+                  <a:srgbClr val="FFC000"/>
+                </a:solidFill>
+              </a:rPr>
+              <a:t> resources: </a:t>
+            </a:r>
+            <a:r>
+              <a:rPr lang="en-US" b="1" dirty="0" smtClean="0">
+                <a:solidFill>
+                  <a:srgbClr val="92D050"/>
+                </a:solidFill>
+              </a:rPr>
+              <a:t>Other </a:t>
+            </a:r>
+            <a:r>
+              <a:rPr lang="en-US" b="1" dirty="0" err="1" smtClean="0">
+                <a:solidFill>
+                  <a:srgbClr val="92D050"/>
+                </a:solidFill>
+              </a:rPr>
+              <a:t>util</a:t>
+            </a:r>
+            <a:r>
+              <a:rPr lang="en-US" b="1" dirty="0" smtClean="0">
+                <a:solidFill>
+                  <a:srgbClr val="92D050"/>
+                </a:solidFill>
+              </a:rPr>
+              <a:t> resources</a:t>
+            </a:r>
+            <a:endParaRPr lang="en-US" b="1" dirty="0">
+              <a:solidFill>
+                <a:srgbClr val="92D050"/>
+              </a:solidFill>
+            </a:endParaRPr>
+          </a:p>
+        </p:txBody>
+      </p:sp>
     </p:spTree>
     <p:extLst>
       <p:ext uri="{BB962C8B-B14F-4D97-AF65-F5344CB8AC3E}">
@@ -6269,13 +7234,13 @@
   <p:clrMapOvr>
     <a:masterClrMapping/>
   </p:clrMapOvr>
-  <mc:AlternateContent xmlns:mc="http://schemas.openxmlformats.org/markup-compatibility/2006">
-    <mc:Choice xmlns:p14="http://schemas.microsoft.com/office/powerpoint/2010/main" Requires="p14">
+  <mc:AlternateContent xmlns:mc="http://schemas.openxmlformats.org/markup-compatibility/2006" xmlns:p14="http://schemas.microsoft.com/office/powerpoint/2010/main">
+    <mc:Choice Requires="p14">
       <p:transition spd="slow" p14:dur="2500">
         <p:checker/>
       </p:transition>
     </mc:Choice>
-    <mc:Fallback>
+    <mc:Fallback xmlns="">
       <p:transition spd="slow">
         <p:checker/>
       </p:transition>
@@ -6818,6 +7783,59 @@
                       </p:childTnLst>
                     </p:cTn>
                   </p:par>
+                  <p:par>
+                    <p:cTn id="47" fill="hold">
+                      <p:stCondLst>
+                        <p:cond delay="indefinite"/>
+                      </p:stCondLst>
+                      <p:childTnLst>
+                        <p:par>
+                          <p:cTn id="48" fill="hold">
+                            <p:stCondLst>
+                              <p:cond delay="0"/>
+                            </p:stCondLst>
+                            <p:childTnLst>
+                              <p:par>
+                                <p:cTn id="49" presetID="16" presetClass="entr" presetSubtype="21" fill="hold" grpId="0" nodeType="clickEffect">
+                                  <p:stCondLst>
+                                    <p:cond delay="0"/>
+                                  </p:stCondLst>
+                                  <p:childTnLst>
+                                    <p:set>
+                                      <p:cBhvr>
+                                        <p:cTn id="50" dur="1" fill="hold">
+                                          <p:stCondLst>
+                                            <p:cond delay="0"/>
+                                          </p:stCondLst>
+                                        </p:cTn>
+                                        <p:tgtEl>
+                                          <p:spTgt spid="3"/>
+                                        </p:tgtEl>
+                                        <p:attrNameLst>
+                                          <p:attrName>style.visibility</p:attrName>
+                                        </p:attrNameLst>
+                                      </p:cBhvr>
+                                      <p:to>
+                                        <p:strVal val="visible"/>
+                                      </p:to>
+                                    </p:set>
+                                    <p:animEffect transition="in" filter="barn(inVertical)">
+                                      <p:cBhvr>
+                                        <p:cTn id="51" dur="500"/>
+                                        <p:tgtEl>
+                                          <p:spTgt spid="3"/>
+                                        </p:tgtEl>
+                                      </p:cBhvr>
+                                    </p:animEffect>
+                                  </p:childTnLst>
+                                </p:cTn>
+                              </p:par>
+                            </p:childTnLst>
+                          </p:cTn>
+                        </p:par>
+                      </p:childTnLst>
+                    </p:cTn>
+                  </p:par>
                 </p:childTnLst>
               </p:cTn>
               <p:prevCondLst>
@@ -6849,12 +7867,2207 @@
       <p:bldP spid="36" grpId="0" animBg="1"/>
       <p:bldP spid="37" grpId="0" animBg="1"/>
       <p:bldP spid="38" grpId="0" animBg="1"/>
+      <p:bldP spid="3" grpId="0" animBg="1"/>
     </p:bldLst>
   </p:timing>
 </p:sld>
 </file>
 
 <file path=ppt/slides/slide5.xml><?xml version="1.0" encoding="utf-8"?>
+<p:sld xmlns:a="http://schemas.openxmlformats.org/drawingml/2006/main" xmlns:r="http://schemas.openxmlformats.org/officeDocument/2006/relationships" xmlns:p="http://schemas.openxmlformats.org/presentationml/2006/main">
+  <p:cSld>
+    <p:spTree>
+      <p:nvGrpSpPr>
+        <p:cNvPr id="1" name=""/>
+        <p:cNvGrpSpPr/>
+        <p:nvPr/>
+      </p:nvGrpSpPr>
+      <p:grpSpPr>
+        <a:xfrm>
+          <a:off x="0" y="0"/>
+          <a:ext cx="0" cy="0"/>
+          <a:chOff x="0" y="0"/>
+          <a:chExt cx="0" cy="0"/>
+        </a:xfrm>
+      </p:grpSpPr>
+      <p:sp>
+        <p:nvSpPr>
+          <p:cNvPr id="2" name="Title 1"/>
+          <p:cNvSpPr>
+            <a:spLocks noGrp="1"/>
+          </p:cNvSpPr>
+          <p:nvPr>
+            <p:ph type="title"/>
+          </p:nvPr>
+        </p:nvSpPr>
+        <p:spPr>
+          <a:xfrm>
+            <a:off x="76200" y="152400"/>
+            <a:ext cx="3810000" cy="579438"/>
+          </a:xfrm>
+        </p:spPr>
+        <p:style>
+          <a:lnRef idx="3">
+            <a:schemeClr val="lt1"/>
+          </a:lnRef>
+          <a:fillRef idx="1">
+            <a:schemeClr val="dk1"/>
+          </a:fillRef>
+          <a:effectRef idx="1">
+            <a:schemeClr val="dk1"/>
+          </a:effectRef>
+          <a:fontRef idx="minor">
+            <a:schemeClr val="lt1"/>
+          </a:fontRef>
+        </p:style>
+        <p:txBody>
+          <a:bodyPr/>
+          <a:lstStyle/>
+          <a:p>
+            <a:pPr algn="ctr"/>
+            <a:r>
+              <a:rPr lang="en-US" b="1" dirty="0" err="1" smtClean="0">
+                <a:solidFill>
+                  <a:srgbClr val="FFFF00"/>
+                </a:solidFill>
+              </a:rPr>
+              <a:t>Exemplu</a:t>
+            </a:r>
+            <a:r>
+              <a:rPr lang="en-US" b="1" dirty="0" smtClean="0">
+                <a:solidFill>
+                  <a:srgbClr val="FFFF00"/>
+                </a:solidFill>
+              </a:rPr>
+              <a:t> de </a:t>
+            </a:r>
+            <a:r>
+              <a:rPr lang="en-US" b="1" dirty="0" err="1" smtClean="0">
+                <a:solidFill>
+                  <a:srgbClr val="FFFF00"/>
+                </a:solidFill>
+              </a:rPr>
+              <a:t>rulare</a:t>
+            </a:r>
+            <a:endParaRPr lang="en-US" b="1" dirty="0">
+              <a:solidFill>
+                <a:srgbClr val="FFFF00"/>
+              </a:solidFill>
+            </a:endParaRPr>
+          </a:p>
+        </p:txBody>
+      </p:sp>
+      <p:pic>
+        <p:nvPicPr>
+          <p:cNvPr id="1027" name="Picture 3"/>
+          <p:cNvPicPr>
+            <a:picLocks noChangeAspect="1" noChangeArrowheads="1"/>
+          </p:cNvPicPr>
+          <p:nvPr/>
+        </p:nvPicPr>
+        <p:blipFill>
+          <a:blip r:embed="rId2">
+            <a:extLst>
+              <a:ext uri="{28A0092B-C50C-407E-A947-70E740481C1C}">
+                <a14:useLocalDpi xmlns:a14="http://schemas.microsoft.com/office/drawing/2010/main" val="0"/>
+              </a:ext>
+            </a:extLst>
+          </a:blip>
+          <a:srcRect/>
+          <a:stretch>
+            <a:fillRect/>
+          </a:stretch>
+        </p:blipFill>
+        <p:spPr bwMode="auto">
+          <a:xfrm>
+            <a:off x="162636" y="1066801"/>
+            <a:ext cx="3886200" cy="4648200"/>
+          </a:xfrm>
+          <a:prstGeom prst="rect">
+            <a:avLst/>
+          </a:prstGeom>
+          <a:noFill/>
+          <a:ln>
+            <a:noFill/>
+          </a:ln>
+          <a:effectLst/>
+          <a:extLst>
+            <a:ext uri="{909E8E84-426E-40DD-AFC4-6F175D3DCCD1}">
+              <a14:hiddenFill xmlns:a14="http://schemas.microsoft.com/office/drawing/2010/main">
+                <a:solidFill>
+                  <a:schemeClr val="accent1"/>
+                </a:solidFill>
+              </a14:hiddenFill>
+            </a:ext>
+            <a:ext uri="{91240B29-F687-4F45-9708-019B960494DF}">
+              <a14:hiddenLine xmlns:a14="http://schemas.microsoft.com/office/drawing/2010/main" w="9525">
+                <a:solidFill>
+                  <a:schemeClr val="tx1"/>
+                </a:solidFill>
+                <a:miter lim="800000"/>
+                <a:headEnd/>
+                <a:tailEnd/>
+              </a14:hiddenLine>
+            </a:ext>
+            <a:ext uri="{AF507438-7753-43E0-B8FC-AC1667EBCBE1}">
+              <a14:hiddenEffects xmlns:a14="http://schemas.microsoft.com/office/drawing/2010/main">
+                <a:effectLst>
+                  <a:outerShdw dist="35921" dir="2700000" algn="ctr" rotWithShape="0">
+                    <a:schemeClr val="bg2"/>
+                  </a:outerShdw>
+                </a:effectLst>
+              </a14:hiddenEffects>
+            </a:ext>
+          </a:extLst>
+        </p:spPr>
+      </p:pic>
+      <p:sp>
+        <p:nvSpPr>
+          <p:cNvPr id="3" name="Content Placeholder 2"/>
+          <p:cNvSpPr>
+            <a:spLocks noGrp="1"/>
+          </p:cNvSpPr>
+          <p:nvPr>
+            <p:ph sz="quarter" idx="13"/>
+          </p:nvPr>
+        </p:nvSpPr>
+        <p:spPr>
+          <a:xfrm>
+            <a:off x="4191000" y="228600"/>
+            <a:ext cx="4800600" cy="5481484"/>
+          </a:xfrm>
+        </p:spPr>
+        <p:style>
+          <a:lnRef idx="3">
+            <a:schemeClr val="lt1"/>
+          </a:lnRef>
+          <a:fillRef idx="1">
+            <a:schemeClr val="dk1"/>
+          </a:fillRef>
+          <a:effectRef idx="1">
+            <a:schemeClr val="dk1"/>
+          </a:effectRef>
+          <a:fontRef idx="minor">
+            <a:schemeClr val="lt1"/>
+          </a:fontRef>
+        </p:style>
+        <p:txBody>
+          <a:bodyPr>
+            <a:normAutofit fontScale="92500" lnSpcReduction="10000"/>
+          </a:bodyPr>
+          <a:lstStyle/>
+          <a:p>
+            <a:r>
+              <a:rPr lang="en-US" sz="2300" b="1" dirty="0" smtClean="0">
+                <a:solidFill>
+                  <a:srgbClr val="92D050"/>
+                </a:solidFill>
+              </a:rPr>
+              <a:t>Pentru a </a:t>
+            </a:r>
+            <a:r>
+              <a:rPr lang="en-US" sz="2300" b="1" dirty="0" err="1" smtClean="0">
+                <a:solidFill>
+                  <a:srgbClr val="92D050"/>
+                </a:solidFill>
+              </a:rPr>
+              <a:t>rula</a:t>
+            </a:r>
+            <a:r>
+              <a:rPr lang="en-US" sz="2300" b="1" dirty="0" smtClean="0">
+                <a:solidFill>
+                  <a:srgbClr val="92D050"/>
+                </a:solidFill>
+              </a:rPr>
+              <a:t> aplicatia este </a:t>
+            </a:r>
+            <a:r>
+              <a:rPr lang="en-US" sz="2300" b="1" dirty="0" err="1" smtClean="0">
+                <a:solidFill>
+                  <a:srgbClr val="92D050"/>
+                </a:solidFill>
+              </a:rPr>
+              <a:t>nevoie</a:t>
+            </a:r>
+            <a:r>
+              <a:rPr lang="en-US" sz="2300" b="1" dirty="0" smtClean="0">
+                <a:solidFill>
+                  <a:srgbClr val="92D050"/>
+                </a:solidFill>
+              </a:rPr>
+              <a:t> </a:t>
+            </a:r>
+            <a:r>
+              <a:rPr lang="en-US" sz="2300" b="1" dirty="0" err="1" smtClean="0">
+                <a:solidFill>
+                  <a:srgbClr val="92D050"/>
+                </a:solidFill>
+              </a:rPr>
+              <a:t>sa</a:t>
+            </a:r>
+            <a:r>
+              <a:rPr lang="en-US" sz="2300" b="1" dirty="0" smtClean="0">
+                <a:solidFill>
+                  <a:srgbClr val="92D050"/>
+                </a:solidFill>
+              </a:rPr>
+              <a:t> </a:t>
+            </a:r>
+            <a:r>
+              <a:rPr lang="en-US" sz="2300" b="1" dirty="0" err="1" smtClean="0">
+                <a:solidFill>
+                  <a:srgbClr val="92D050"/>
+                </a:solidFill>
+              </a:rPr>
+              <a:t>rulam</a:t>
+            </a:r>
+            <a:r>
+              <a:rPr lang="en-US" sz="2300" b="1" dirty="0" smtClean="0">
+                <a:solidFill>
+                  <a:srgbClr val="92D050"/>
+                </a:solidFill>
+              </a:rPr>
+              <a:t> </a:t>
+            </a:r>
+            <a:r>
+              <a:rPr lang="en-US" sz="2300" b="1" dirty="0" err="1" smtClean="0">
+                <a:solidFill>
+                  <a:srgbClr val="92D050"/>
+                </a:solidFill>
+              </a:rPr>
+              <a:t>clasa</a:t>
+            </a:r>
+            <a:r>
+              <a:rPr lang="en-US" sz="2300" b="1" dirty="0" smtClean="0">
+                <a:solidFill>
+                  <a:srgbClr val="92D050"/>
+                </a:solidFill>
+              </a:rPr>
+              <a:t> Main </a:t>
+            </a:r>
+            <a:r>
+              <a:rPr lang="en-US" sz="2300" b="1" dirty="0" err="1" smtClean="0">
+                <a:solidFill>
+                  <a:srgbClr val="92D050"/>
+                </a:solidFill>
+              </a:rPr>
+              <a:t>ca</a:t>
+            </a:r>
+            <a:r>
+              <a:rPr lang="en-US" sz="2300" b="1" dirty="0" smtClean="0">
+                <a:solidFill>
+                  <a:srgbClr val="92D050"/>
+                </a:solidFill>
+              </a:rPr>
+              <a:t> si aplicatie java </a:t>
+            </a:r>
+            <a:r>
+              <a:rPr lang="en-US" sz="2300" b="1" dirty="0" err="1" smtClean="0">
+                <a:solidFill>
+                  <a:srgbClr val="92D050"/>
+                </a:solidFill>
+              </a:rPr>
+              <a:t>principala</a:t>
+            </a:r>
+            <a:r>
+              <a:rPr lang="en-US" sz="2300" b="1" dirty="0" smtClean="0">
+                <a:solidFill>
+                  <a:srgbClr val="92D050"/>
+                </a:solidFill>
+              </a:rPr>
+              <a:t>.</a:t>
+            </a:r>
+          </a:p>
+          <a:p>
+            <a:endParaRPr lang="en-US" sz="2300" b="1" dirty="0" smtClean="0">
+              <a:solidFill>
+                <a:srgbClr val="92D050"/>
+              </a:solidFill>
+            </a:endParaRPr>
+          </a:p>
+          <a:p>
+            <a:r>
+              <a:rPr lang="en-US" sz="2300" b="1" dirty="0" smtClean="0">
+                <a:solidFill>
+                  <a:srgbClr val="92D050"/>
+                </a:solidFill>
+              </a:rPr>
+              <a:t>Catalog </a:t>
+            </a:r>
+            <a:r>
+              <a:rPr lang="en-US" sz="2300" b="1" dirty="0" err="1" smtClean="0">
+                <a:solidFill>
+                  <a:srgbClr val="92D050"/>
+                </a:solidFill>
+              </a:rPr>
+              <a:t>Studenti</a:t>
+            </a:r>
+            <a:r>
+              <a:rPr lang="en-US" sz="2300" b="1" dirty="0" smtClean="0">
+                <a:solidFill>
+                  <a:srgbClr val="92D050"/>
+                </a:solidFill>
+              </a:rPr>
+              <a:t> este frame-ul aplicatiei </a:t>
+            </a:r>
+            <a:r>
+              <a:rPr lang="en-US" sz="2300" b="1" dirty="0" err="1" smtClean="0">
+                <a:solidFill>
+                  <a:srgbClr val="92D050"/>
+                </a:solidFill>
+              </a:rPr>
+              <a:t>StudentManagement</a:t>
+            </a:r>
+            <a:r>
+              <a:rPr lang="en-US" sz="2300" b="1" dirty="0" smtClean="0">
+                <a:solidFill>
+                  <a:srgbClr val="92D050"/>
+                </a:solidFill>
+              </a:rPr>
+              <a:t>.</a:t>
+            </a:r>
+          </a:p>
+          <a:p>
+            <a:endParaRPr lang="en-US" sz="2300" b="1" dirty="0" smtClean="0">
+              <a:solidFill>
+                <a:srgbClr val="92D050"/>
+              </a:solidFill>
+            </a:endParaRPr>
+          </a:p>
+          <a:p>
+            <a:r>
+              <a:rPr lang="en-US" sz="2300" b="1" dirty="0" err="1" smtClean="0">
+                <a:solidFill>
+                  <a:srgbClr val="FFFF00"/>
+                </a:solidFill>
+              </a:rPr>
+              <a:t>Aici</a:t>
+            </a:r>
+            <a:r>
+              <a:rPr lang="en-US" sz="2300" b="1" dirty="0" smtClean="0">
+                <a:solidFill>
+                  <a:srgbClr val="FFFF00"/>
+                </a:solidFill>
+              </a:rPr>
+              <a:t> </a:t>
+            </a:r>
+            <a:r>
+              <a:rPr lang="en-US" sz="2300" b="1" dirty="0" err="1" smtClean="0">
+                <a:solidFill>
+                  <a:srgbClr val="FFFF00"/>
+                </a:solidFill>
+              </a:rPr>
+              <a:t>putem</a:t>
+            </a:r>
+            <a:r>
+              <a:rPr lang="en-US" sz="2300" b="1" dirty="0" smtClean="0">
+                <a:solidFill>
+                  <a:srgbClr val="FFFF00"/>
+                </a:solidFill>
+              </a:rPr>
+              <a:t> </a:t>
+            </a:r>
+            <a:r>
+              <a:rPr lang="en-US" sz="2300" b="1" dirty="0" err="1" smtClean="0">
+                <a:solidFill>
+                  <a:srgbClr val="FFFF00"/>
+                </a:solidFill>
+              </a:rPr>
+              <a:t>accesa</a:t>
+            </a:r>
+            <a:r>
+              <a:rPr lang="en-US" sz="2300" b="1" dirty="0" smtClean="0">
+                <a:solidFill>
+                  <a:srgbClr val="FFFF00"/>
+                </a:solidFill>
+              </a:rPr>
+              <a:t> </a:t>
+            </a:r>
+            <a:r>
+              <a:rPr lang="en-US" sz="2300" b="1" dirty="0" err="1" smtClean="0">
+                <a:solidFill>
+                  <a:srgbClr val="FFFF00"/>
+                </a:solidFill>
+              </a:rPr>
+              <a:t>functionalitatile</a:t>
+            </a:r>
+            <a:r>
+              <a:rPr lang="en-US" sz="2300" b="1" dirty="0" smtClean="0">
+                <a:solidFill>
+                  <a:srgbClr val="FFFF00"/>
+                </a:solidFill>
+              </a:rPr>
+              <a:t> aplicatiei: </a:t>
+            </a:r>
+            <a:r>
+              <a:rPr lang="en-US" sz="2300" b="1" dirty="0" err="1" smtClean="0">
+                <a:solidFill>
+                  <a:srgbClr val="92D050"/>
+                </a:solidFill>
+              </a:rPr>
+              <a:t>Importul</a:t>
+            </a:r>
+            <a:r>
+              <a:rPr lang="en-US" sz="2300" b="1" dirty="0" smtClean="0">
+                <a:solidFill>
+                  <a:srgbClr val="92D050"/>
+                </a:solidFill>
+              </a:rPr>
+              <a:t> pentru cele 3 </a:t>
+            </a:r>
+            <a:r>
+              <a:rPr lang="en-US" sz="2300" b="1" dirty="0" err="1" smtClean="0">
+                <a:solidFill>
+                  <a:srgbClr val="92D050"/>
+                </a:solidFill>
+              </a:rPr>
+              <a:t>fisiere</a:t>
+            </a:r>
+            <a:r>
+              <a:rPr lang="en-US" sz="2300" b="1" dirty="0" smtClean="0">
+                <a:solidFill>
+                  <a:srgbClr val="92D050"/>
+                </a:solidFill>
+              </a:rPr>
+              <a:t> xml pentru input(</a:t>
+            </a:r>
+            <a:r>
+              <a:rPr lang="en-US" sz="2300" b="1" dirty="0" err="1" smtClean="0">
+                <a:solidFill>
+                  <a:srgbClr val="92D050"/>
+                </a:solidFill>
+              </a:rPr>
+              <a:t>Student,Materie,Nota</a:t>
+            </a:r>
+            <a:r>
+              <a:rPr lang="en-US" sz="2300" b="1" dirty="0" smtClean="0">
+                <a:solidFill>
+                  <a:srgbClr val="92D050"/>
+                </a:solidFill>
+              </a:rPr>
+              <a:t>), vizualizarea datelor </a:t>
+            </a:r>
+            <a:r>
+              <a:rPr lang="en-US" sz="2300" b="1" dirty="0" err="1" smtClean="0">
+                <a:solidFill>
+                  <a:srgbClr val="92D050"/>
+                </a:solidFill>
+              </a:rPr>
+              <a:t>parsate</a:t>
+            </a:r>
+            <a:r>
+              <a:rPr lang="en-US" sz="2300" b="1" dirty="0" smtClean="0">
+                <a:solidFill>
+                  <a:srgbClr val="92D050"/>
+                </a:solidFill>
+              </a:rPr>
+              <a:t>  in format de </a:t>
+            </a:r>
+            <a:r>
+              <a:rPr lang="en-US" sz="2300" b="1" dirty="0" err="1" smtClean="0">
+                <a:solidFill>
+                  <a:srgbClr val="92D050"/>
+                </a:solidFill>
+              </a:rPr>
+              <a:t>tabel</a:t>
+            </a:r>
+            <a:r>
+              <a:rPr lang="en-US" sz="2300" b="1" dirty="0" smtClean="0">
+                <a:solidFill>
+                  <a:srgbClr val="92D050"/>
+                </a:solidFill>
+              </a:rPr>
+              <a:t> </a:t>
+            </a:r>
+            <a:r>
+              <a:rPr lang="en-US" sz="2300" b="1" dirty="0" err="1" smtClean="0">
+                <a:solidFill>
+                  <a:srgbClr val="92D050"/>
+                </a:solidFill>
+              </a:rPr>
+              <a:t>intr</a:t>
+            </a:r>
+            <a:r>
+              <a:rPr lang="en-US" sz="2300" b="1" dirty="0" smtClean="0">
+                <a:solidFill>
+                  <a:srgbClr val="92D050"/>
+                </a:solidFill>
+              </a:rPr>
+              <a:t>-un </a:t>
+            </a:r>
+            <a:r>
+              <a:rPr lang="en-US" sz="2300" b="1" dirty="0" err="1" smtClean="0">
+                <a:solidFill>
+                  <a:srgbClr val="92D050"/>
+                </a:solidFill>
+              </a:rPr>
+              <a:t>gridview</a:t>
+            </a:r>
+            <a:r>
+              <a:rPr lang="en-US" sz="2300" b="1" dirty="0" smtClean="0">
+                <a:solidFill>
+                  <a:srgbClr val="92D050"/>
+                </a:solidFill>
+              </a:rPr>
+              <a:t>, si </a:t>
+            </a:r>
+            <a:r>
+              <a:rPr lang="en-US" sz="2300" b="1" dirty="0" err="1" smtClean="0">
+                <a:solidFill>
+                  <a:srgbClr val="92D050"/>
+                </a:solidFill>
+              </a:rPr>
+              <a:t>butonul</a:t>
+            </a:r>
+            <a:r>
+              <a:rPr lang="en-US" sz="2300" b="1" dirty="0" smtClean="0">
+                <a:solidFill>
+                  <a:srgbClr val="92D050"/>
+                </a:solidFill>
+              </a:rPr>
+              <a:t> de </a:t>
+            </a:r>
+            <a:r>
+              <a:rPr lang="en-US" sz="2300" b="1" dirty="0" err="1" smtClean="0">
+                <a:solidFill>
+                  <a:srgbClr val="92D050"/>
+                </a:solidFill>
+              </a:rPr>
+              <a:t>generare</a:t>
+            </a:r>
+            <a:r>
+              <a:rPr lang="en-US" sz="2300" b="1" dirty="0" smtClean="0">
+                <a:solidFill>
+                  <a:srgbClr val="92D050"/>
+                </a:solidFill>
+              </a:rPr>
+              <a:t> a </a:t>
+            </a:r>
+            <a:r>
+              <a:rPr lang="en-US" sz="2300" b="1" dirty="0" err="1" smtClean="0">
+                <a:solidFill>
+                  <a:srgbClr val="92D050"/>
+                </a:solidFill>
+              </a:rPr>
+              <a:t>raportului</a:t>
+            </a:r>
+            <a:r>
+              <a:rPr lang="en-US" sz="2300" b="1" dirty="0" smtClean="0">
+                <a:solidFill>
+                  <a:srgbClr val="92D050"/>
+                </a:solidFill>
+              </a:rPr>
+              <a:t> pentru </a:t>
+            </a:r>
+            <a:r>
+              <a:rPr lang="en-US" sz="2300" b="1" dirty="0" err="1" smtClean="0">
+                <a:solidFill>
+                  <a:srgbClr val="92D050"/>
+                </a:solidFill>
+              </a:rPr>
+              <a:t>ouput</a:t>
+            </a:r>
+            <a:r>
+              <a:rPr lang="en-US" sz="2300" b="1" dirty="0" smtClean="0">
+                <a:solidFill>
+                  <a:srgbClr val="92D050"/>
+                </a:solidFill>
+              </a:rPr>
+              <a:t>, </a:t>
+            </a:r>
+            <a:r>
+              <a:rPr lang="en-US" sz="2300" b="1" dirty="0" err="1" smtClean="0">
+                <a:solidFill>
+                  <a:srgbClr val="92D050"/>
+                </a:solidFill>
+              </a:rPr>
+              <a:t>raportul</a:t>
+            </a:r>
+            <a:r>
+              <a:rPr lang="en-US" sz="2300" b="1" dirty="0" smtClean="0">
+                <a:solidFill>
+                  <a:srgbClr val="92D050"/>
+                </a:solidFill>
+              </a:rPr>
+              <a:t> </a:t>
+            </a:r>
+            <a:r>
+              <a:rPr lang="en-US" sz="2300" b="1" dirty="0" err="1" smtClean="0">
+                <a:solidFill>
+                  <a:srgbClr val="92D050"/>
+                </a:solidFill>
+              </a:rPr>
+              <a:t>fiind</a:t>
+            </a:r>
+            <a:r>
+              <a:rPr lang="en-US" sz="2300" b="1" dirty="0" smtClean="0">
+                <a:solidFill>
+                  <a:srgbClr val="92D050"/>
+                </a:solidFill>
+              </a:rPr>
+              <a:t> </a:t>
+            </a:r>
+            <a:r>
+              <a:rPr lang="en-US" sz="2300" b="1" dirty="0" err="1" smtClean="0">
+                <a:solidFill>
+                  <a:srgbClr val="92D050"/>
+                </a:solidFill>
+              </a:rPr>
+              <a:t>generat</a:t>
+            </a:r>
+            <a:r>
+              <a:rPr lang="en-US" sz="2300" b="1" dirty="0" smtClean="0">
+                <a:solidFill>
+                  <a:srgbClr val="92D050"/>
+                </a:solidFill>
+              </a:rPr>
+              <a:t> sub format xml pentru </a:t>
+            </a:r>
+            <a:r>
+              <a:rPr lang="en-US" sz="2300" b="1" dirty="0">
+                <a:solidFill>
+                  <a:srgbClr val="92D050"/>
+                </a:solidFill>
+              </a:rPr>
+              <a:t>o </a:t>
+            </a:r>
+            <a:r>
+              <a:rPr lang="en-US" sz="2300" b="1" dirty="0" err="1">
+                <a:solidFill>
+                  <a:srgbClr val="92D050"/>
+                </a:solidFill>
+              </a:rPr>
+              <a:t>disciplina</a:t>
+            </a:r>
+            <a:r>
+              <a:rPr lang="en-US" sz="2300" b="1" dirty="0">
+                <a:solidFill>
+                  <a:srgbClr val="92D050"/>
+                </a:solidFill>
+              </a:rPr>
+              <a:t> </a:t>
+            </a:r>
+            <a:r>
+              <a:rPr lang="en-US" sz="2300" b="1" dirty="0" err="1" smtClean="0">
+                <a:solidFill>
+                  <a:srgbClr val="92D050"/>
+                </a:solidFill>
+              </a:rPr>
+              <a:t>specificata</a:t>
+            </a:r>
+            <a:r>
+              <a:rPr lang="en-US" sz="2300" b="1" dirty="0" smtClean="0">
+                <a:solidFill>
+                  <a:srgbClr val="92D050"/>
+                </a:solidFill>
+              </a:rPr>
+              <a:t>.</a:t>
+            </a:r>
+          </a:p>
+          <a:p>
+            <a:endParaRPr lang="en-US" dirty="0"/>
+          </a:p>
+        </p:txBody>
+      </p:sp>
+    </p:spTree>
+    <p:extLst>
+      <p:ext uri="{BB962C8B-B14F-4D97-AF65-F5344CB8AC3E}">
+        <p14:creationId xmlns:p14="http://schemas.microsoft.com/office/powerpoint/2010/main" val="2473157082"/>
+      </p:ext>
+    </p:extLst>
+  </p:cSld>
+  <p:clrMapOvr>
+    <a:masterClrMapping/>
+  </p:clrMapOvr>
+  <p:transition spd="slow">
+    <p:push dir="u"/>
+  </p:transition>
+  <p:timing>
+    <p:tnLst>
+      <p:par>
+        <p:cTn id="1" dur="indefinite" restart="never" nodeType="tmRoot">
+          <p:childTnLst>
+            <p:seq concurrent="1" nextAc="seek">
+              <p:cTn id="2" dur="indefinite" nodeType="mainSeq">
+                <p:childTnLst>
+                  <p:par>
+                    <p:cTn id="3" fill="hold">
+                      <p:stCondLst>
+                        <p:cond delay="indefinite"/>
+                      </p:stCondLst>
+                      <p:childTnLst>
+                        <p:par>
+                          <p:cTn id="4" fill="hold">
+                            <p:stCondLst>
+                              <p:cond delay="0"/>
+                            </p:stCondLst>
+                            <p:childTnLst>
+                              <p:par>
+                                <p:cTn id="5" presetID="2" presetClass="entr" presetSubtype="4" fill="hold" nodeType="clickEffect">
+                                  <p:stCondLst>
+                                    <p:cond delay="0"/>
+                                  </p:stCondLst>
+                                  <p:childTnLst>
+                                    <p:set>
+                                      <p:cBhvr>
+                                        <p:cTn id="6" dur="1" fill="hold">
+                                          <p:stCondLst>
+                                            <p:cond delay="0"/>
+                                          </p:stCondLst>
+                                        </p:cTn>
+                                        <p:tgtEl>
+                                          <p:spTgt spid="1027"/>
+                                        </p:tgtEl>
+                                        <p:attrNameLst>
+                                          <p:attrName>style.visibility</p:attrName>
+                                        </p:attrNameLst>
+                                      </p:cBhvr>
+                                      <p:to>
+                                        <p:strVal val="visible"/>
+                                      </p:to>
+                                    </p:set>
+                                    <p:anim calcmode="lin" valueType="num">
+                                      <p:cBhvr additive="base">
+                                        <p:cTn id="7" dur="500" fill="hold"/>
+                                        <p:tgtEl>
+                                          <p:spTgt spid="1027"/>
+                                        </p:tgtEl>
+                                        <p:attrNameLst>
+                                          <p:attrName>ppt_x</p:attrName>
+                                        </p:attrNameLst>
+                                      </p:cBhvr>
+                                      <p:tavLst>
+                                        <p:tav tm="0">
+                                          <p:val>
+                                            <p:strVal val="#ppt_x"/>
+                                          </p:val>
+                                        </p:tav>
+                                        <p:tav tm="100000">
+                                          <p:val>
+                                            <p:strVal val="#ppt_x"/>
+                                          </p:val>
+                                        </p:tav>
+                                      </p:tavLst>
+                                    </p:anim>
+                                    <p:anim calcmode="lin" valueType="num">
+                                      <p:cBhvr additive="base">
+                                        <p:cTn id="8" dur="500" fill="hold"/>
+                                        <p:tgtEl>
+                                          <p:spTgt spid="1027"/>
+                                        </p:tgtEl>
+                                        <p:attrNameLst>
+                                          <p:attrName>ppt_y</p:attrName>
+                                        </p:attrNameLst>
+                                      </p:cBhvr>
+                                      <p:tavLst>
+                                        <p:tav tm="0">
+                                          <p:val>
+                                            <p:strVal val="1+#ppt_h/2"/>
+                                          </p:val>
+                                        </p:tav>
+                                        <p:tav tm="100000">
+                                          <p:val>
+                                            <p:strVal val="#ppt_y"/>
+                                          </p:val>
+                                        </p:tav>
+                                      </p:tavLst>
+                                    </p:anim>
+                                  </p:childTnLst>
+                                </p:cTn>
+                              </p:par>
+                            </p:childTnLst>
+                          </p:cTn>
+                        </p:par>
+                      </p:childTnLst>
+                    </p:cTn>
+                  </p:par>
+                  <p:par>
+                    <p:cTn id="9" fill="hold">
+                      <p:stCondLst>
+                        <p:cond delay="indefinite"/>
+                      </p:stCondLst>
+                      <p:childTnLst>
+                        <p:par>
+                          <p:cTn id="10" fill="hold">
+                            <p:stCondLst>
+                              <p:cond delay="0"/>
+                            </p:stCondLst>
+                            <p:childTnLst>
+                              <p:par>
+                                <p:cTn id="11" presetID="31" presetClass="entr" presetSubtype="0" fill="hold" grpId="0" nodeType="clickEffect">
+                                  <p:stCondLst>
+                                    <p:cond delay="0"/>
+                                  </p:stCondLst>
+                                  <p:childTnLst>
+                                    <p:set>
+                                      <p:cBhvr>
+                                        <p:cTn id="12" dur="1" fill="hold">
+                                          <p:stCondLst>
+                                            <p:cond delay="0"/>
+                                          </p:stCondLst>
+                                        </p:cTn>
+                                        <p:tgtEl>
+                                          <p:spTgt spid="3">
+                                            <p:bg/>
+                                          </p:spTgt>
+                                        </p:tgtEl>
+                                        <p:attrNameLst>
+                                          <p:attrName>style.visibility</p:attrName>
+                                        </p:attrNameLst>
+                                      </p:cBhvr>
+                                      <p:to>
+                                        <p:strVal val="visible"/>
+                                      </p:to>
+                                    </p:set>
+                                    <p:anim calcmode="lin" valueType="num">
+                                      <p:cBhvr>
+                                        <p:cTn id="13" dur="1000" fill="hold"/>
+                                        <p:tgtEl>
+                                          <p:spTgt spid="3">
+                                            <p:bg/>
+                                          </p:spTgt>
+                                        </p:tgtEl>
+                                        <p:attrNameLst>
+                                          <p:attrName>ppt_w</p:attrName>
+                                        </p:attrNameLst>
+                                      </p:cBhvr>
+                                      <p:tavLst>
+                                        <p:tav tm="0">
+                                          <p:val>
+                                            <p:fltVal val="0"/>
+                                          </p:val>
+                                        </p:tav>
+                                        <p:tav tm="100000">
+                                          <p:val>
+                                            <p:strVal val="#ppt_w"/>
+                                          </p:val>
+                                        </p:tav>
+                                      </p:tavLst>
+                                    </p:anim>
+                                    <p:anim calcmode="lin" valueType="num">
+                                      <p:cBhvr>
+                                        <p:cTn id="14" dur="1000" fill="hold"/>
+                                        <p:tgtEl>
+                                          <p:spTgt spid="3">
+                                            <p:bg/>
+                                          </p:spTgt>
+                                        </p:tgtEl>
+                                        <p:attrNameLst>
+                                          <p:attrName>ppt_h</p:attrName>
+                                        </p:attrNameLst>
+                                      </p:cBhvr>
+                                      <p:tavLst>
+                                        <p:tav tm="0">
+                                          <p:val>
+                                            <p:fltVal val="0"/>
+                                          </p:val>
+                                        </p:tav>
+                                        <p:tav tm="100000">
+                                          <p:val>
+                                            <p:strVal val="#ppt_h"/>
+                                          </p:val>
+                                        </p:tav>
+                                      </p:tavLst>
+                                    </p:anim>
+                                    <p:anim calcmode="lin" valueType="num">
+                                      <p:cBhvr>
+                                        <p:cTn id="15" dur="1000" fill="hold"/>
+                                        <p:tgtEl>
+                                          <p:spTgt spid="3">
+                                            <p:bg/>
+                                          </p:spTgt>
+                                        </p:tgtEl>
+                                        <p:attrNameLst>
+                                          <p:attrName>style.rotation</p:attrName>
+                                        </p:attrNameLst>
+                                      </p:cBhvr>
+                                      <p:tavLst>
+                                        <p:tav tm="0">
+                                          <p:val>
+                                            <p:fltVal val="90"/>
+                                          </p:val>
+                                        </p:tav>
+                                        <p:tav tm="100000">
+                                          <p:val>
+                                            <p:fltVal val="0"/>
+                                          </p:val>
+                                        </p:tav>
+                                      </p:tavLst>
+                                    </p:anim>
+                                    <p:animEffect transition="in" filter="fade">
+                                      <p:cBhvr>
+                                        <p:cTn id="16" dur="1000"/>
+                                        <p:tgtEl>
+                                          <p:spTgt spid="3">
+                                            <p:bg/>
+                                          </p:spTgt>
+                                        </p:tgtEl>
+                                      </p:cBhvr>
+                                    </p:animEffect>
+                                  </p:childTnLst>
+                                </p:cTn>
+                              </p:par>
+                            </p:childTnLst>
+                          </p:cTn>
+                        </p:par>
+                      </p:childTnLst>
+                    </p:cTn>
+                  </p:par>
+                  <p:par>
+                    <p:cTn id="17" fill="hold">
+                      <p:stCondLst>
+                        <p:cond delay="indefinite"/>
+                      </p:stCondLst>
+                      <p:childTnLst>
+                        <p:par>
+                          <p:cTn id="18" fill="hold">
+                            <p:stCondLst>
+                              <p:cond delay="0"/>
+                            </p:stCondLst>
+                            <p:childTnLst>
+                              <p:par>
+                                <p:cTn id="19" presetID="31" presetClass="entr" presetSubtype="0" fill="hold" grpId="0" nodeType="clickEffect">
+                                  <p:stCondLst>
+                                    <p:cond delay="0"/>
+                                  </p:stCondLst>
+                                  <p:childTnLst>
+                                    <p:set>
+                                      <p:cBhvr>
+                                        <p:cTn id="20" dur="1" fill="hold">
+                                          <p:stCondLst>
+                                            <p:cond delay="0"/>
+                                          </p:stCondLst>
+                                        </p:cTn>
+                                        <p:tgtEl>
+                                          <p:spTgt spid="3">
+                                            <p:txEl>
+                                              <p:pRg st="0" end="0"/>
+                                            </p:txEl>
+                                          </p:spTgt>
+                                        </p:tgtEl>
+                                        <p:attrNameLst>
+                                          <p:attrName>style.visibility</p:attrName>
+                                        </p:attrNameLst>
+                                      </p:cBhvr>
+                                      <p:to>
+                                        <p:strVal val="visible"/>
+                                      </p:to>
+                                    </p:set>
+                                    <p:anim calcmode="lin" valueType="num">
+                                      <p:cBhvr>
+                                        <p:cTn id="21" dur="1000" fill="hold"/>
+                                        <p:tgtEl>
+                                          <p:spTgt spid="3">
+                                            <p:txEl>
+                                              <p:pRg st="0" end="0"/>
+                                            </p:txEl>
+                                          </p:spTgt>
+                                        </p:tgtEl>
+                                        <p:attrNameLst>
+                                          <p:attrName>ppt_w</p:attrName>
+                                        </p:attrNameLst>
+                                      </p:cBhvr>
+                                      <p:tavLst>
+                                        <p:tav tm="0">
+                                          <p:val>
+                                            <p:fltVal val="0"/>
+                                          </p:val>
+                                        </p:tav>
+                                        <p:tav tm="100000">
+                                          <p:val>
+                                            <p:strVal val="#ppt_w"/>
+                                          </p:val>
+                                        </p:tav>
+                                      </p:tavLst>
+                                    </p:anim>
+                                    <p:anim calcmode="lin" valueType="num">
+                                      <p:cBhvr>
+                                        <p:cTn id="22" dur="1000" fill="hold"/>
+                                        <p:tgtEl>
+                                          <p:spTgt spid="3">
+                                            <p:txEl>
+                                              <p:pRg st="0" end="0"/>
+                                            </p:txEl>
+                                          </p:spTgt>
+                                        </p:tgtEl>
+                                        <p:attrNameLst>
+                                          <p:attrName>ppt_h</p:attrName>
+                                        </p:attrNameLst>
+                                      </p:cBhvr>
+                                      <p:tavLst>
+                                        <p:tav tm="0">
+                                          <p:val>
+                                            <p:fltVal val="0"/>
+                                          </p:val>
+                                        </p:tav>
+                                        <p:tav tm="100000">
+                                          <p:val>
+                                            <p:strVal val="#ppt_h"/>
+                                          </p:val>
+                                        </p:tav>
+                                      </p:tavLst>
+                                    </p:anim>
+                                    <p:anim calcmode="lin" valueType="num">
+                                      <p:cBhvr>
+                                        <p:cTn id="23" dur="1000" fill="hold"/>
+                                        <p:tgtEl>
+                                          <p:spTgt spid="3">
+                                            <p:txEl>
+                                              <p:pRg st="0" end="0"/>
+                                            </p:txEl>
+                                          </p:spTgt>
+                                        </p:tgtEl>
+                                        <p:attrNameLst>
+                                          <p:attrName>style.rotation</p:attrName>
+                                        </p:attrNameLst>
+                                      </p:cBhvr>
+                                      <p:tavLst>
+                                        <p:tav tm="0">
+                                          <p:val>
+                                            <p:fltVal val="90"/>
+                                          </p:val>
+                                        </p:tav>
+                                        <p:tav tm="100000">
+                                          <p:val>
+                                            <p:fltVal val="0"/>
+                                          </p:val>
+                                        </p:tav>
+                                      </p:tavLst>
+                                    </p:anim>
+                                    <p:animEffect transition="in" filter="fade">
+                                      <p:cBhvr>
+                                        <p:cTn id="24" dur="1000"/>
+                                        <p:tgtEl>
+                                          <p:spTgt spid="3">
+                                            <p:txEl>
+                                              <p:pRg st="0" end="0"/>
+                                            </p:txEl>
+                                          </p:spTgt>
+                                        </p:tgtEl>
+                                      </p:cBhvr>
+                                    </p:animEffect>
+                                  </p:childTnLst>
+                                </p:cTn>
+                              </p:par>
+                            </p:childTnLst>
+                          </p:cTn>
+                        </p:par>
+                      </p:childTnLst>
+                    </p:cTn>
+                  </p:par>
+                  <p:par>
+                    <p:cTn id="25" fill="hold">
+                      <p:stCondLst>
+                        <p:cond delay="indefinite"/>
+                      </p:stCondLst>
+                      <p:childTnLst>
+                        <p:par>
+                          <p:cTn id="26" fill="hold">
+                            <p:stCondLst>
+                              <p:cond delay="0"/>
+                            </p:stCondLst>
+                            <p:childTnLst>
+                              <p:par>
+                                <p:cTn id="27" presetID="31" presetClass="entr" presetSubtype="0" fill="hold" grpId="0" nodeType="clickEffect">
+                                  <p:stCondLst>
+                                    <p:cond delay="0"/>
+                                  </p:stCondLst>
+                                  <p:childTnLst>
+                                    <p:set>
+                                      <p:cBhvr>
+                                        <p:cTn id="28" dur="1" fill="hold">
+                                          <p:stCondLst>
+                                            <p:cond delay="0"/>
+                                          </p:stCondLst>
+                                        </p:cTn>
+                                        <p:tgtEl>
+                                          <p:spTgt spid="3">
+                                            <p:txEl>
+                                              <p:pRg st="2" end="2"/>
+                                            </p:txEl>
+                                          </p:spTgt>
+                                        </p:tgtEl>
+                                        <p:attrNameLst>
+                                          <p:attrName>style.visibility</p:attrName>
+                                        </p:attrNameLst>
+                                      </p:cBhvr>
+                                      <p:to>
+                                        <p:strVal val="visible"/>
+                                      </p:to>
+                                    </p:set>
+                                    <p:anim calcmode="lin" valueType="num">
+                                      <p:cBhvr>
+                                        <p:cTn id="29" dur="1000" fill="hold"/>
+                                        <p:tgtEl>
+                                          <p:spTgt spid="3">
+                                            <p:txEl>
+                                              <p:pRg st="2" end="2"/>
+                                            </p:txEl>
+                                          </p:spTgt>
+                                        </p:tgtEl>
+                                        <p:attrNameLst>
+                                          <p:attrName>ppt_w</p:attrName>
+                                        </p:attrNameLst>
+                                      </p:cBhvr>
+                                      <p:tavLst>
+                                        <p:tav tm="0">
+                                          <p:val>
+                                            <p:fltVal val="0"/>
+                                          </p:val>
+                                        </p:tav>
+                                        <p:tav tm="100000">
+                                          <p:val>
+                                            <p:strVal val="#ppt_w"/>
+                                          </p:val>
+                                        </p:tav>
+                                      </p:tavLst>
+                                    </p:anim>
+                                    <p:anim calcmode="lin" valueType="num">
+                                      <p:cBhvr>
+                                        <p:cTn id="30" dur="1000" fill="hold"/>
+                                        <p:tgtEl>
+                                          <p:spTgt spid="3">
+                                            <p:txEl>
+                                              <p:pRg st="2" end="2"/>
+                                            </p:txEl>
+                                          </p:spTgt>
+                                        </p:tgtEl>
+                                        <p:attrNameLst>
+                                          <p:attrName>ppt_h</p:attrName>
+                                        </p:attrNameLst>
+                                      </p:cBhvr>
+                                      <p:tavLst>
+                                        <p:tav tm="0">
+                                          <p:val>
+                                            <p:fltVal val="0"/>
+                                          </p:val>
+                                        </p:tav>
+                                        <p:tav tm="100000">
+                                          <p:val>
+                                            <p:strVal val="#ppt_h"/>
+                                          </p:val>
+                                        </p:tav>
+                                      </p:tavLst>
+                                    </p:anim>
+                                    <p:anim calcmode="lin" valueType="num">
+                                      <p:cBhvr>
+                                        <p:cTn id="31" dur="1000" fill="hold"/>
+                                        <p:tgtEl>
+                                          <p:spTgt spid="3">
+                                            <p:txEl>
+                                              <p:pRg st="2" end="2"/>
+                                            </p:txEl>
+                                          </p:spTgt>
+                                        </p:tgtEl>
+                                        <p:attrNameLst>
+                                          <p:attrName>style.rotation</p:attrName>
+                                        </p:attrNameLst>
+                                      </p:cBhvr>
+                                      <p:tavLst>
+                                        <p:tav tm="0">
+                                          <p:val>
+                                            <p:fltVal val="90"/>
+                                          </p:val>
+                                        </p:tav>
+                                        <p:tav tm="100000">
+                                          <p:val>
+                                            <p:fltVal val="0"/>
+                                          </p:val>
+                                        </p:tav>
+                                      </p:tavLst>
+                                    </p:anim>
+                                    <p:animEffect transition="in" filter="fade">
+                                      <p:cBhvr>
+                                        <p:cTn id="32" dur="1000"/>
+                                        <p:tgtEl>
+                                          <p:spTgt spid="3">
+                                            <p:txEl>
+                                              <p:pRg st="2" end="2"/>
+                                            </p:txEl>
+                                          </p:spTgt>
+                                        </p:tgtEl>
+                                      </p:cBhvr>
+                                    </p:animEffect>
+                                  </p:childTnLst>
+                                </p:cTn>
+                              </p:par>
+                            </p:childTnLst>
+                          </p:cTn>
+                        </p:par>
+                      </p:childTnLst>
+                    </p:cTn>
+                  </p:par>
+                  <p:par>
+                    <p:cTn id="33" fill="hold">
+                      <p:stCondLst>
+                        <p:cond delay="indefinite"/>
+                      </p:stCondLst>
+                      <p:childTnLst>
+                        <p:par>
+                          <p:cTn id="34" fill="hold">
+                            <p:stCondLst>
+                              <p:cond delay="0"/>
+                            </p:stCondLst>
+                            <p:childTnLst>
+                              <p:par>
+                                <p:cTn id="35" presetID="31" presetClass="entr" presetSubtype="0" fill="hold" grpId="0" nodeType="clickEffect">
+                                  <p:stCondLst>
+                                    <p:cond delay="0"/>
+                                  </p:stCondLst>
+                                  <p:childTnLst>
+                                    <p:set>
+                                      <p:cBhvr>
+                                        <p:cTn id="36" dur="1" fill="hold">
+                                          <p:stCondLst>
+                                            <p:cond delay="0"/>
+                                          </p:stCondLst>
+                                        </p:cTn>
+                                        <p:tgtEl>
+                                          <p:spTgt spid="3">
+                                            <p:txEl>
+                                              <p:pRg st="4" end="4"/>
+                                            </p:txEl>
+                                          </p:spTgt>
+                                        </p:tgtEl>
+                                        <p:attrNameLst>
+                                          <p:attrName>style.visibility</p:attrName>
+                                        </p:attrNameLst>
+                                      </p:cBhvr>
+                                      <p:to>
+                                        <p:strVal val="visible"/>
+                                      </p:to>
+                                    </p:set>
+                                    <p:anim calcmode="lin" valueType="num">
+                                      <p:cBhvr>
+                                        <p:cTn id="37" dur="1000" fill="hold"/>
+                                        <p:tgtEl>
+                                          <p:spTgt spid="3">
+                                            <p:txEl>
+                                              <p:pRg st="4" end="4"/>
+                                            </p:txEl>
+                                          </p:spTgt>
+                                        </p:tgtEl>
+                                        <p:attrNameLst>
+                                          <p:attrName>ppt_w</p:attrName>
+                                        </p:attrNameLst>
+                                      </p:cBhvr>
+                                      <p:tavLst>
+                                        <p:tav tm="0">
+                                          <p:val>
+                                            <p:fltVal val="0"/>
+                                          </p:val>
+                                        </p:tav>
+                                        <p:tav tm="100000">
+                                          <p:val>
+                                            <p:strVal val="#ppt_w"/>
+                                          </p:val>
+                                        </p:tav>
+                                      </p:tavLst>
+                                    </p:anim>
+                                    <p:anim calcmode="lin" valueType="num">
+                                      <p:cBhvr>
+                                        <p:cTn id="38" dur="1000" fill="hold"/>
+                                        <p:tgtEl>
+                                          <p:spTgt spid="3">
+                                            <p:txEl>
+                                              <p:pRg st="4" end="4"/>
+                                            </p:txEl>
+                                          </p:spTgt>
+                                        </p:tgtEl>
+                                        <p:attrNameLst>
+                                          <p:attrName>ppt_h</p:attrName>
+                                        </p:attrNameLst>
+                                      </p:cBhvr>
+                                      <p:tavLst>
+                                        <p:tav tm="0">
+                                          <p:val>
+                                            <p:fltVal val="0"/>
+                                          </p:val>
+                                        </p:tav>
+                                        <p:tav tm="100000">
+                                          <p:val>
+                                            <p:strVal val="#ppt_h"/>
+                                          </p:val>
+                                        </p:tav>
+                                      </p:tavLst>
+                                    </p:anim>
+                                    <p:anim calcmode="lin" valueType="num">
+                                      <p:cBhvr>
+                                        <p:cTn id="39" dur="1000" fill="hold"/>
+                                        <p:tgtEl>
+                                          <p:spTgt spid="3">
+                                            <p:txEl>
+                                              <p:pRg st="4" end="4"/>
+                                            </p:txEl>
+                                          </p:spTgt>
+                                        </p:tgtEl>
+                                        <p:attrNameLst>
+                                          <p:attrName>style.rotation</p:attrName>
+                                        </p:attrNameLst>
+                                      </p:cBhvr>
+                                      <p:tavLst>
+                                        <p:tav tm="0">
+                                          <p:val>
+                                            <p:fltVal val="90"/>
+                                          </p:val>
+                                        </p:tav>
+                                        <p:tav tm="100000">
+                                          <p:val>
+                                            <p:fltVal val="0"/>
+                                          </p:val>
+                                        </p:tav>
+                                      </p:tavLst>
+                                    </p:anim>
+                                    <p:animEffect transition="in" filter="fade">
+                                      <p:cBhvr>
+                                        <p:cTn id="40" dur="1000"/>
+                                        <p:tgtEl>
+                                          <p:spTgt spid="3">
+                                            <p:txEl>
+                                              <p:pRg st="4" end="4"/>
+                                            </p:txEl>
+                                          </p:spTgt>
+                                        </p:tgtEl>
+                                      </p:cBhvr>
+                                    </p:animEffect>
+                                  </p:childTnLst>
+                                </p:cTn>
+                              </p:par>
+                            </p:childTnLst>
+                          </p:cTn>
+                        </p:par>
+                      </p:childTnLst>
+                    </p:cTn>
+                  </p:par>
+                </p:childTnLst>
+              </p:cTn>
+              <p:prevCondLst>
+                <p:cond evt="onPrev" delay="0">
+                  <p:tgtEl>
+                    <p:sldTgt/>
+                  </p:tgtEl>
+                </p:cond>
+              </p:prevCondLst>
+              <p:nextCondLst>
+                <p:cond evt="onNext" delay="0">
+                  <p:tgtEl>
+                    <p:sldTgt/>
+                  </p:tgtEl>
+                </p:cond>
+              </p:nextCondLst>
+            </p:seq>
+          </p:childTnLst>
+        </p:cTn>
+      </p:par>
+    </p:tnLst>
+    <p:bldLst>
+      <p:bldP spid="3" grpId="0" build="p" animBg="1"/>
+    </p:bldLst>
+  </p:timing>
+</p:sld>
+</file>
+
+<file path=ppt/slides/slide6.xml><?xml version="1.0" encoding="utf-8"?>
+<p:sld xmlns:a="http://schemas.openxmlformats.org/drawingml/2006/main" xmlns:r="http://schemas.openxmlformats.org/officeDocument/2006/relationships" xmlns:p="http://schemas.openxmlformats.org/presentationml/2006/main">
+  <p:cSld>
+    <p:spTree>
+      <p:nvGrpSpPr>
+        <p:cNvPr id="1" name=""/>
+        <p:cNvGrpSpPr/>
+        <p:nvPr/>
+      </p:nvGrpSpPr>
+      <p:grpSpPr>
+        <a:xfrm>
+          <a:off x="0" y="0"/>
+          <a:ext cx="0" cy="0"/>
+          <a:chOff x="0" y="0"/>
+          <a:chExt cx="0" cy="0"/>
+        </a:xfrm>
+      </p:grpSpPr>
+      <p:sp>
+        <p:nvSpPr>
+          <p:cNvPr id="2" name="Title 1"/>
+          <p:cNvSpPr>
+            <a:spLocks noGrp="1"/>
+          </p:cNvSpPr>
+          <p:nvPr>
+            <p:ph type="title"/>
+          </p:nvPr>
+        </p:nvSpPr>
+        <p:spPr>
+          <a:xfrm>
+            <a:off x="152400" y="228600"/>
+            <a:ext cx="3962400" cy="579438"/>
+          </a:xfrm>
+        </p:spPr>
+        <p:style>
+          <a:lnRef idx="2">
+            <a:schemeClr val="dk1">
+              <a:shade val="50000"/>
+            </a:schemeClr>
+          </a:lnRef>
+          <a:fillRef idx="1">
+            <a:schemeClr val="dk1"/>
+          </a:fillRef>
+          <a:effectRef idx="0">
+            <a:schemeClr val="dk1"/>
+          </a:effectRef>
+          <a:fontRef idx="minor">
+            <a:schemeClr val="lt1"/>
+          </a:fontRef>
+        </p:style>
+        <p:txBody>
+          <a:bodyPr/>
+          <a:lstStyle/>
+          <a:p>
+            <a:r>
+              <a:rPr lang="en-US" sz="2400" b="1" dirty="0" smtClean="0">
+                <a:solidFill>
+                  <a:srgbClr val="FFFF00"/>
+                </a:solidFill>
+              </a:rPr>
+              <a:t>Output pentru aplicatie</a:t>
+            </a:r>
+            <a:endParaRPr lang="en-US" sz="2400" b="1" dirty="0">
+              <a:solidFill>
+                <a:srgbClr val="FFFF00"/>
+              </a:solidFill>
+            </a:endParaRPr>
+          </a:p>
+        </p:txBody>
+      </p:sp>
+      <p:pic>
+        <p:nvPicPr>
+          <p:cNvPr id="2050" name="Picture 2"/>
+          <p:cNvPicPr>
+            <a:picLocks noGrp="1" noChangeAspect="1" noChangeArrowheads="1"/>
+          </p:cNvPicPr>
+          <p:nvPr>
+            <p:ph sz="quarter" idx="13"/>
+          </p:nvPr>
+        </p:nvPicPr>
+        <p:blipFill>
+          <a:blip r:embed="rId2">
+            <a:extLst>
+              <a:ext uri="{28A0092B-C50C-407E-A947-70E740481C1C}">
+                <a14:useLocalDpi xmlns:a14="http://schemas.microsoft.com/office/drawing/2010/main" val="0"/>
+              </a:ext>
+            </a:extLst>
+          </a:blip>
+          <a:srcRect/>
+          <a:stretch>
+            <a:fillRect/>
+          </a:stretch>
+        </p:blipFill>
+        <p:spPr bwMode="auto">
+          <a:xfrm>
+            <a:off x="152400" y="1295400"/>
+            <a:ext cx="4634911" cy="4343400"/>
+          </a:xfrm>
+          <a:prstGeom prst="rect">
+            <a:avLst/>
+          </a:prstGeom>
+          <a:noFill/>
+          <a:ln>
+            <a:noFill/>
+          </a:ln>
+          <a:effectLst/>
+          <a:extLst>
+            <a:ext uri="{909E8E84-426E-40DD-AFC4-6F175D3DCCD1}">
+              <a14:hiddenFill xmlns:a14="http://schemas.microsoft.com/office/drawing/2010/main">
+                <a:solidFill>
+                  <a:schemeClr val="accent1"/>
+                </a:solidFill>
+              </a14:hiddenFill>
+            </a:ext>
+            <a:ext uri="{91240B29-F687-4F45-9708-019B960494DF}">
+              <a14:hiddenLine xmlns:a14="http://schemas.microsoft.com/office/drawing/2010/main" w="9525">
+                <a:solidFill>
+                  <a:schemeClr val="tx1"/>
+                </a:solidFill>
+                <a:miter lim="800000"/>
+                <a:headEnd/>
+                <a:tailEnd/>
+              </a14:hiddenLine>
+            </a:ext>
+            <a:ext uri="{AF507438-7753-43E0-B8FC-AC1667EBCBE1}">
+              <a14:hiddenEffects xmlns:a14="http://schemas.microsoft.com/office/drawing/2010/main">
+                <a:effectLst>
+                  <a:outerShdw dist="35921" dir="2700000" algn="ctr" rotWithShape="0">
+                    <a:schemeClr val="bg2"/>
+                  </a:outerShdw>
+                </a:effectLst>
+              </a14:hiddenEffects>
+            </a:ext>
+          </a:extLst>
+        </p:spPr>
+      </p:pic>
+      <p:sp>
+        <p:nvSpPr>
+          <p:cNvPr id="4" name="TextBox 3"/>
+          <p:cNvSpPr txBox="1"/>
+          <p:nvPr/>
+        </p:nvSpPr>
+        <p:spPr>
+          <a:xfrm>
+            <a:off x="4953000" y="533400"/>
+            <a:ext cx="3962400" cy="2308324"/>
+          </a:xfrm>
+          <a:prstGeom prst="rect">
+            <a:avLst/>
+          </a:prstGeom>
+        </p:spPr>
+        <p:style>
+          <a:lnRef idx="3">
+            <a:schemeClr val="lt1"/>
+          </a:lnRef>
+          <a:fillRef idx="1">
+            <a:schemeClr val="dk1"/>
+          </a:fillRef>
+          <a:effectRef idx="1">
+            <a:schemeClr val="dk1"/>
+          </a:effectRef>
+          <a:fontRef idx="minor">
+            <a:schemeClr val="lt1"/>
+          </a:fontRef>
+        </p:style>
+        <p:txBody>
+          <a:bodyPr wrap="square" rtlCol="0">
+            <a:spAutoFit/>
+          </a:bodyPr>
+          <a:lstStyle/>
+          <a:p>
+            <a:r>
+              <a:rPr lang="en-US" b="1" dirty="0" smtClean="0">
+                <a:solidFill>
+                  <a:srgbClr val="92D050"/>
+                </a:solidFill>
+              </a:rPr>
+              <a:t>In </a:t>
+            </a:r>
+            <a:r>
+              <a:rPr lang="en-US" b="1" dirty="0" err="1" smtClean="0">
+                <a:solidFill>
+                  <a:srgbClr val="92D050"/>
+                </a:solidFill>
+              </a:rPr>
+              <a:t>urma</a:t>
+            </a:r>
+            <a:r>
+              <a:rPr lang="en-US" b="1" dirty="0" smtClean="0">
+                <a:solidFill>
+                  <a:srgbClr val="92D050"/>
+                </a:solidFill>
+              </a:rPr>
+              <a:t> </a:t>
+            </a:r>
+            <a:r>
+              <a:rPr lang="en-US" b="1" dirty="0" err="1" smtClean="0">
+                <a:solidFill>
+                  <a:srgbClr val="92D050"/>
+                </a:solidFill>
+              </a:rPr>
+              <a:t>rularii</a:t>
+            </a:r>
+            <a:r>
+              <a:rPr lang="en-US" b="1" dirty="0" smtClean="0">
+                <a:solidFill>
+                  <a:srgbClr val="92D050"/>
+                </a:solidFill>
+              </a:rPr>
+              <a:t> aplicatiei, </a:t>
+            </a:r>
+            <a:r>
+              <a:rPr lang="en-US" b="1" dirty="0" err="1" smtClean="0">
+                <a:solidFill>
+                  <a:srgbClr val="92D050"/>
+                </a:solidFill>
+              </a:rPr>
+              <a:t>utilizatorul</a:t>
+            </a:r>
+            <a:r>
+              <a:rPr lang="en-US" b="1" dirty="0" smtClean="0">
+                <a:solidFill>
+                  <a:srgbClr val="92D050"/>
+                </a:solidFill>
+              </a:rPr>
+              <a:t> va </a:t>
+            </a:r>
+            <a:r>
+              <a:rPr lang="en-US" b="1" dirty="0" err="1" smtClean="0">
+                <a:solidFill>
+                  <a:srgbClr val="92D050"/>
+                </a:solidFill>
+              </a:rPr>
+              <a:t>primi</a:t>
+            </a:r>
+            <a:r>
+              <a:rPr lang="en-US" b="1" dirty="0" smtClean="0">
+                <a:solidFill>
+                  <a:srgbClr val="92D050"/>
+                </a:solidFill>
+              </a:rPr>
+              <a:t> </a:t>
+            </a:r>
+            <a:r>
+              <a:rPr lang="en-US" b="1" dirty="0" err="1" smtClean="0">
+                <a:solidFill>
+                  <a:srgbClr val="92D050"/>
+                </a:solidFill>
+              </a:rPr>
+              <a:t>ca</a:t>
+            </a:r>
+            <a:r>
+              <a:rPr lang="en-US" b="1" dirty="0" smtClean="0">
+                <a:solidFill>
+                  <a:srgbClr val="92D050"/>
+                </a:solidFill>
+              </a:rPr>
+              <a:t> output un </a:t>
+            </a:r>
+            <a:r>
+              <a:rPr lang="en-US" b="1" dirty="0" err="1" smtClean="0">
+                <a:solidFill>
+                  <a:srgbClr val="92D050"/>
+                </a:solidFill>
+              </a:rPr>
+              <a:t>raport</a:t>
+            </a:r>
+            <a:r>
+              <a:rPr lang="en-US" b="1" dirty="0" smtClean="0">
+                <a:solidFill>
+                  <a:srgbClr val="92D050"/>
+                </a:solidFill>
+              </a:rPr>
+              <a:t> sub format xml.</a:t>
+            </a:r>
+          </a:p>
+          <a:p>
+            <a:endParaRPr lang="en-US" b="1" dirty="0">
+              <a:solidFill>
+                <a:srgbClr val="92D050"/>
+              </a:solidFill>
+            </a:endParaRPr>
+          </a:p>
+          <a:p>
+            <a:r>
+              <a:rPr lang="en-US" b="1" dirty="0" err="1" smtClean="0">
+                <a:solidFill>
+                  <a:srgbClr val="92D050"/>
+                </a:solidFill>
+              </a:rPr>
+              <a:t>Structura</a:t>
+            </a:r>
+            <a:r>
+              <a:rPr lang="en-US" b="1" dirty="0" smtClean="0">
+                <a:solidFill>
+                  <a:srgbClr val="92D050"/>
+                </a:solidFill>
+              </a:rPr>
+              <a:t> </a:t>
+            </a:r>
+            <a:r>
+              <a:rPr lang="en-US" b="1" dirty="0" err="1" smtClean="0">
+                <a:solidFill>
+                  <a:srgbClr val="92D050"/>
+                </a:solidFill>
+              </a:rPr>
+              <a:t>acestuia</a:t>
+            </a:r>
+            <a:r>
+              <a:rPr lang="en-US" b="1" dirty="0" smtClean="0">
+                <a:solidFill>
+                  <a:srgbClr val="92D050"/>
+                </a:solidFill>
+              </a:rPr>
+              <a:t> este </a:t>
+            </a:r>
+            <a:r>
+              <a:rPr lang="en-US" b="1" dirty="0" err="1" smtClean="0">
+                <a:solidFill>
+                  <a:srgbClr val="92D050"/>
+                </a:solidFill>
+              </a:rPr>
+              <a:t>prezentata</a:t>
+            </a:r>
+            <a:r>
+              <a:rPr lang="en-US" b="1" dirty="0" smtClean="0">
+                <a:solidFill>
+                  <a:srgbClr val="92D050"/>
+                </a:solidFill>
+              </a:rPr>
+              <a:t> in </a:t>
+            </a:r>
+            <a:r>
+              <a:rPr lang="en-US" b="1" dirty="0" err="1" smtClean="0">
+                <a:solidFill>
+                  <a:srgbClr val="92D050"/>
+                </a:solidFill>
+              </a:rPr>
+              <a:t>imaginea</a:t>
+            </a:r>
+            <a:r>
+              <a:rPr lang="en-US" b="1" dirty="0" smtClean="0">
+                <a:solidFill>
+                  <a:srgbClr val="92D050"/>
+                </a:solidFill>
+              </a:rPr>
+              <a:t> </a:t>
+            </a:r>
+            <a:r>
+              <a:rPr lang="en-US" b="1" dirty="0" err="1" smtClean="0">
+                <a:solidFill>
+                  <a:srgbClr val="92D050"/>
+                </a:solidFill>
+              </a:rPr>
+              <a:t>alaturata</a:t>
+            </a:r>
+            <a:r>
+              <a:rPr lang="en-US" b="1" dirty="0" smtClean="0">
+                <a:solidFill>
+                  <a:srgbClr val="92D050"/>
+                </a:solidFill>
+              </a:rPr>
+              <a:t>. </a:t>
+            </a:r>
+          </a:p>
+          <a:p>
+            <a:endParaRPr lang="en-US" b="1" dirty="0">
+              <a:solidFill>
+                <a:srgbClr val="92D050"/>
+              </a:solidFill>
+            </a:endParaRPr>
+          </a:p>
+          <a:p>
+            <a:r>
+              <a:rPr lang="en-US" b="1" dirty="0" smtClean="0">
+                <a:solidFill>
+                  <a:srgbClr val="92D050"/>
+                </a:solidFill>
+              </a:rPr>
+              <a:t>De </a:t>
+            </a:r>
+            <a:r>
+              <a:rPr lang="en-US" b="1" dirty="0" err="1" smtClean="0">
+                <a:solidFill>
+                  <a:srgbClr val="92D050"/>
+                </a:solidFill>
+              </a:rPr>
+              <a:t>specificat</a:t>
+            </a:r>
+            <a:r>
+              <a:rPr lang="en-US" b="1" dirty="0" smtClean="0">
+                <a:solidFill>
+                  <a:srgbClr val="92D050"/>
+                </a:solidFill>
+              </a:rPr>
+              <a:t> </a:t>
+            </a:r>
+            <a:r>
+              <a:rPr lang="en-US" b="1" dirty="0" err="1" smtClean="0">
+                <a:solidFill>
+                  <a:srgbClr val="92D050"/>
+                </a:solidFill>
+              </a:rPr>
+              <a:t>faptul</a:t>
+            </a:r>
+            <a:r>
+              <a:rPr lang="en-US" b="1" dirty="0" smtClean="0">
+                <a:solidFill>
+                  <a:srgbClr val="92D050"/>
+                </a:solidFill>
+              </a:rPr>
+              <a:t> </a:t>
+            </a:r>
+            <a:r>
+              <a:rPr lang="en-US" b="1" dirty="0" err="1" smtClean="0">
+                <a:solidFill>
+                  <a:srgbClr val="92D050"/>
+                </a:solidFill>
+              </a:rPr>
+              <a:t>ca</a:t>
+            </a:r>
+            <a:r>
+              <a:rPr lang="en-US" b="1" dirty="0" smtClean="0">
+                <a:solidFill>
+                  <a:srgbClr val="92D050"/>
+                </a:solidFill>
+              </a:rPr>
+              <a:t> </a:t>
+            </a:r>
+            <a:r>
+              <a:rPr lang="en-US" b="1" dirty="0" err="1" smtClean="0">
+                <a:solidFill>
+                  <a:srgbClr val="92D050"/>
+                </a:solidFill>
+              </a:rPr>
+              <a:t>studentii</a:t>
+            </a:r>
+            <a:r>
+              <a:rPr lang="en-US" b="1" dirty="0" smtClean="0">
+                <a:solidFill>
+                  <a:srgbClr val="92D050"/>
+                </a:solidFill>
+              </a:rPr>
+              <a:t> sunt </a:t>
+            </a:r>
+            <a:r>
+              <a:rPr lang="en-US" b="1" dirty="0" err="1" smtClean="0">
+                <a:solidFill>
+                  <a:srgbClr val="92D050"/>
+                </a:solidFill>
+              </a:rPr>
+              <a:t>ordonati</a:t>
+            </a:r>
+            <a:r>
+              <a:rPr lang="en-US" b="1" dirty="0" smtClean="0">
+                <a:solidFill>
+                  <a:srgbClr val="92D050"/>
+                </a:solidFill>
+              </a:rPr>
+              <a:t> in </a:t>
+            </a:r>
+            <a:r>
+              <a:rPr lang="en-US" b="1" dirty="0" err="1" smtClean="0">
+                <a:solidFill>
+                  <a:srgbClr val="92D050"/>
+                </a:solidFill>
+              </a:rPr>
+              <a:t>functie</a:t>
+            </a:r>
+            <a:r>
+              <a:rPr lang="en-US" b="1" dirty="0" smtClean="0">
+                <a:solidFill>
+                  <a:srgbClr val="92D050"/>
+                </a:solidFill>
+              </a:rPr>
+              <a:t> de id.</a:t>
+            </a:r>
+            <a:endParaRPr lang="en-US" b="1" dirty="0">
+              <a:solidFill>
+                <a:srgbClr val="92D050"/>
+              </a:solidFill>
+            </a:endParaRPr>
+          </a:p>
+        </p:txBody>
+      </p:sp>
+    </p:spTree>
+    <p:extLst>
+      <p:ext uri="{BB962C8B-B14F-4D97-AF65-F5344CB8AC3E}">
+        <p14:creationId xmlns:p14="http://schemas.microsoft.com/office/powerpoint/2010/main" val="2362537282"/>
+      </p:ext>
+    </p:extLst>
+  </p:cSld>
+  <p:clrMapOvr>
+    <a:masterClrMapping/>
+  </p:clrMapOvr>
+  <p:transition spd="slow">
+    <p:wipe/>
+  </p:transition>
+  <p:timing>
+    <p:tnLst>
+      <p:par>
+        <p:cTn id="1" dur="indefinite" restart="never" nodeType="tmRoot">
+          <p:childTnLst>
+            <p:seq concurrent="1" nextAc="seek">
+              <p:cTn id="2" dur="indefinite" nodeType="mainSeq">
+                <p:childTnLst>
+                  <p:par>
+                    <p:cTn id="3" fill="hold">
+                      <p:stCondLst>
+                        <p:cond delay="indefinite"/>
+                      </p:stCondLst>
+                      <p:childTnLst>
+                        <p:par>
+                          <p:cTn id="4" fill="hold">
+                            <p:stCondLst>
+                              <p:cond delay="0"/>
+                            </p:stCondLst>
+                            <p:childTnLst>
+                              <p:par>
+                                <p:cTn id="5" presetID="2" presetClass="entr" presetSubtype="4" fill="hold" grpId="0" nodeType="clickEffect">
+                                  <p:stCondLst>
+                                    <p:cond delay="0"/>
+                                  </p:stCondLst>
+                                  <p:childTnLst>
+                                    <p:set>
+                                      <p:cBhvr>
+                                        <p:cTn id="6" dur="1" fill="hold">
+                                          <p:stCondLst>
+                                            <p:cond delay="0"/>
+                                          </p:stCondLst>
+                                        </p:cTn>
+                                        <p:tgtEl>
+                                          <p:spTgt spid="2"/>
+                                        </p:tgtEl>
+                                        <p:attrNameLst>
+                                          <p:attrName>style.visibility</p:attrName>
+                                        </p:attrNameLst>
+                                      </p:cBhvr>
+                                      <p:to>
+                                        <p:strVal val="visible"/>
+                                      </p:to>
+                                    </p:set>
+                                    <p:anim calcmode="lin" valueType="num">
+                                      <p:cBhvr additive="base">
+                                        <p:cTn id="7" dur="500" fill="hold"/>
+                                        <p:tgtEl>
+                                          <p:spTgt spid="2"/>
+                                        </p:tgtEl>
+                                        <p:attrNameLst>
+                                          <p:attrName>ppt_x</p:attrName>
+                                        </p:attrNameLst>
+                                      </p:cBhvr>
+                                      <p:tavLst>
+                                        <p:tav tm="0">
+                                          <p:val>
+                                            <p:strVal val="#ppt_x"/>
+                                          </p:val>
+                                        </p:tav>
+                                        <p:tav tm="100000">
+                                          <p:val>
+                                            <p:strVal val="#ppt_x"/>
+                                          </p:val>
+                                        </p:tav>
+                                      </p:tavLst>
+                                    </p:anim>
+                                    <p:anim calcmode="lin" valueType="num">
+                                      <p:cBhvr additive="base">
+                                        <p:cTn id="8" dur="500" fill="hold"/>
+                                        <p:tgtEl>
+                                          <p:spTgt spid="2"/>
+                                        </p:tgtEl>
+                                        <p:attrNameLst>
+                                          <p:attrName>ppt_y</p:attrName>
+                                        </p:attrNameLst>
+                                      </p:cBhvr>
+                                      <p:tavLst>
+                                        <p:tav tm="0">
+                                          <p:val>
+                                            <p:strVal val="1+#ppt_h/2"/>
+                                          </p:val>
+                                        </p:tav>
+                                        <p:tav tm="100000">
+                                          <p:val>
+                                            <p:strVal val="#ppt_y"/>
+                                          </p:val>
+                                        </p:tav>
+                                      </p:tavLst>
+                                    </p:anim>
+                                  </p:childTnLst>
+                                </p:cTn>
+                              </p:par>
+                            </p:childTnLst>
+                          </p:cTn>
+                        </p:par>
+                      </p:childTnLst>
+                    </p:cTn>
+                  </p:par>
+                  <p:par>
+                    <p:cTn id="9" fill="hold">
+                      <p:stCondLst>
+                        <p:cond delay="indefinite"/>
+                      </p:stCondLst>
+                      <p:childTnLst>
+                        <p:par>
+                          <p:cTn id="10" fill="hold">
+                            <p:stCondLst>
+                              <p:cond delay="0"/>
+                            </p:stCondLst>
+                            <p:childTnLst>
+                              <p:par>
+                                <p:cTn id="11" presetID="31" presetClass="entr" presetSubtype="0" fill="hold" grpId="0" nodeType="clickEffect">
+                                  <p:stCondLst>
+                                    <p:cond delay="0"/>
+                                  </p:stCondLst>
+                                  <p:childTnLst>
+                                    <p:set>
+                                      <p:cBhvr>
+                                        <p:cTn id="12" dur="1" fill="hold">
+                                          <p:stCondLst>
+                                            <p:cond delay="0"/>
+                                          </p:stCondLst>
+                                        </p:cTn>
+                                        <p:tgtEl>
+                                          <p:spTgt spid="4"/>
+                                        </p:tgtEl>
+                                        <p:attrNameLst>
+                                          <p:attrName>style.visibility</p:attrName>
+                                        </p:attrNameLst>
+                                      </p:cBhvr>
+                                      <p:to>
+                                        <p:strVal val="visible"/>
+                                      </p:to>
+                                    </p:set>
+                                    <p:anim calcmode="lin" valueType="num">
+                                      <p:cBhvr>
+                                        <p:cTn id="13" dur="1000" fill="hold"/>
+                                        <p:tgtEl>
+                                          <p:spTgt spid="4"/>
+                                        </p:tgtEl>
+                                        <p:attrNameLst>
+                                          <p:attrName>ppt_w</p:attrName>
+                                        </p:attrNameLst>
+                                      </p:cBhvr>
+                                      <p:tavLst>
+                                        <p:tav tm="0">
+                                          <p:val>
+                                            <p:fltVal val="0"/>
+                                          </p:val>
+                                        </p:tav>
+                                        <p:tav tm="100000">
+                                          <p:val>
+                                            <p:strVal val="#ppt_w"/>
+                                          </p:val>
+                                        </p:tav>
+                                      </p:tavLst>
+                                    </p:anim>
+                                    <p:anim calcmode="lin" valueType="num">
+                                      <p:cBhvr>
+                                        <p:cTn id="14" dur="1000" fill="hold"/>
+                                        <p:tgtEl>
+                                          <p:spTgt spid="4"/>
+                                        </p:tgtEl>
+                                        <p:attrNameLst>
+                                          <p:attrName>ppt_h</p:attrName>
+                                        </p:attrNameLst>
+                                      </p:cBhvr>
+                                      <p:tavLst>
+                                        <p:tav tm="0">
+                                          <p:val>
+                                            <p:fltVal val="0"/>
+                                          </p:val>
+                                        </p:tav>
+                                        <p:tav tm="100000">
+                                          <p:val>
+                                            <p:strVal val="#ppt_h"/>
+                                          </p:val>
+                                        </p:tav>
+                                      </p:tavLst>
+                                    </p:anim>
+                                    <p:anim calcmode="lin" valueType="num">
+                                      <p:cBhvr>
+                                        <p:cTn id="15" dur="1000" fill="hold"/>
+                                        <p:tgtEl>
+                                          <p:spTgt spid="4"/>
+                                        </p:tgtEl>
+                                        <p:attrNameLst>
+                                          <p:attrName>style.rotation</p:attrName>
+                                        </p:attrNameLst>
+                                      </p:cBhvr>
+                                      <p:tavLst>
+                                        <p:tav tm="0">
+                                          <p:val>
+                                            <p:fltVal val="90"/>
+                                          </p:val>
+                                        </p:tav>
+                                        <p:tav tm="100000">
+                                          <p:val>
+                                            <p:fltVal val="0"/>
+                                          </p:val>
+                                        </p:tav>
+                                      </p:tavLst>
+                                    </p:anim>
+                                    <p:animEffect transition="in" filter="fade">
+                                      <p:cBhvr>
+                                        <p:cTn id="16" dur="1000"/>
+                                        <p:tgtEl>
+                                          <p:spTgt spid="4"/>
+                                        </p:tgtEl>
+                                      </p:cBhvr>
+                                    </p:animEffect>
+                                  </p:childTnLst>
+                                </p:cTn>
+                              </p:par>
+                            </p:childTnLst>
+                          </p:cTn>
+                        </p:par>
+                      </p:childTnLst>
+                    </p:cTn>
+                  </p:par>
+                  <p:par>
+                    <p:cTn id="17" fill="hold">
+                      <p:stCondLst>
+                        <p:cond delay="indefinite"/>
+                      </p:stCondLst>
+                      <p:childTnLst>
+                        <p:par>
+                          <p:cTn id="18" fill="hold">
+                            <p:stCondLst>
+                              <p:cond delay="0"/>
+                            </p:stCondLst>
+                            <p:childTnLst>
+                              <p:par>
+                                <p:cTn id="19" presetID="22" presetClass="entr" presetSubtype="4" fill="hold" nodeType="clickEffect">
+                                  <p:stCondLst>
+                                    <p:cond delay="0"/>
+                                  </p:stCondLst>
+                                  <p:childTnLst>
+                                    <p:set>
+                                      <p:cBhvr>
+                                        <p:cTn id="20" dur="1" fill="hold">
+                                          <p:stCondLst>
+                                            <p:cond delay="0"/>
+                                          </p:stCondLst>
+                                        </p:cTn>
+                                        <p:tgtEl>
+                                          <p:spTgt spid="2050"/>
+                                        </p:tgtEl>
+                                        <p:attrNameLst>
+                                          <p:attrName>style.visibility</p:attrName>
+                                        </p:attrNameLst>
+                                      </p:cBhvr>
+                                      <p:to>
+                                        <p:strVal val="visible"/>
+                                      </p:to>
+                                    </p:set>
+                                    <p:animEffect transition="in" filter="wipe(down)">
+                                      <p:cBhvr>
+                                        <p:cTn id="21" dur="500"/>
+                                        <p:tgtEl>
+                                          <p:spTgt spid="2050"/>
+                                        </p:tgtEl>
+                                      </p:cBhvr>
+                                    </p:animEffect>
+                                  </p:childTnLst>
+                                </p:cTn>
+                              </p:par>
+                            </p:childTnLst>
+                          </p:cTn>
+                        </p:par>
+                      </p:childTnLst>
+                    </p:cTn>
+                  </p:par>
+                </p:childTnLst>
+              </p:cTn>
+              <p:prevCondLst>
+                <p:cond evt="onPrev" delay="0">
+                  <p:tgtEl>
+                    <p:sldTgt/>
+                  </p:tgtEl>
+                </p:cond>
+              </p:prevCondLst>
+              <p:nextCondLst>
+                <p:cond evt="onNext" delay="0">
+                  <p:tgtEl>
+                    <p:sldTgt/>
+                  </p:tgtEl>
+                </p:cond>
+              </p:nextCondLst>
+            </p:seq>
+          </p:childTnLst>
+        </p:cTn>
+      </p:par>
+    </p:tnLst>
+    <p:bldLst>
+      <p:bldP spid="2" grpId="0" animBg="1"/>
+      <p:bldP spid="4" grpId="0" animBg="1"/>
+    </p:bldLst>
+  </p:timing>
+</p:sld>
+</file>
+
+<file path=ppt/slides/slide7.xml><?xml version="1.0" encoding="utf-8"?>
 <p:sld xmlns:a="http://schemas.openxmlformats.org/drawingml/2006/main" xmlns:r="http://schemas.openxmlformats.org/officeDocument/2006/relationships" xmlns:p="http://schemas.openxmlformats.org/presentationml/2006/main">
   <p:cSld>
     <p:spTree>
@@ -6892,10 +10105,10 @@
             <a:schemeClr val="lt1"/>
           </a:lnRef>
           <a:fillRef idx="1">
-            <a:schemeClr val="accent2"/>
+            <a:schemeClr val="dk1"/>
           </a:fillRef>
           <a:effectRef idx="1">
-            <a:schemeClr val="accent2"/>
+            <a:schemeClr val="dk1"/>
           </a:effectRef>
           <a:fontRef idx="minor">
             <a:schemeClr val="lt1"/>
@@ -7260,13 +10473,13 @@
   <p:clrMapOvr>
     <a:masterClrMapping/>
   </p:clrMapOvr>
-  <mc:AlternateContent xmlns:mc="http://schemas.openxmlformats.org/markup-compatibility/2006">
-    <mc:Choice xmlns:p14="http://schemas.microsoft.com/office/powerpoint/2010/main" Requires="p14">
+  <mc:AlternateContent xmlns:mc="http://schemas.openxmlformats.org/markup-compatibility/2006" xmlns:p14="http://schemas.microsoft.com/office/powerpoint/2010/main">
+    <mc:Choice Requires="p14">
       <p:transition spd="slow" p14:dur="1500">
         <p:split orient="vert"/>
       </p:transition>
     </mc:Choice>
-    <mc:Fallback>
+    <mc:Fallback xmlns="">
       <p:transition spd="slow">
         <p:split orient="vert"/>
       </p:transition>
@@ -7275,9 +10488,432 @@
   <p:timing>
     <p:tnLst>
       <p:par>
-        <p:cTn id="1" dur="indefinite" restart="never" nodeType="tmRoot"/>
+        <p:cTn id="1" dur="indefinite" restart="never" nodeType="tmRoot">
+          <p:childTnLst>
+            <p:seq concurrent="1" nextAc="seek">
+              <p:cTn id="2" dur="indefinite" nodeType="mainSeq">
+                <p:childTnLst>
+                  <p:par>
+                    <p:cTn id="3" fill="hold">
+                      <p:stCondLst>
+                        <p:cond delay="indefinite"/>
+                      </p:stCondLst>
+                      <p:childTnLst>
+                        <p:par>
+                          <p:cTn id="4" fill="hold">
+                            <p:stCondLst>
+                              <p:cond delay="0"/>
+                            </p:stCondLst>
+                            <p:childTnLst>
+                              <p:par>
+                                <p:cTn id="5" presetID="31" presetClass="entr" presetSubtype="0" fill="hold" grpId="0" nodeType="clickEffect">
+                                  <p:stCondLst>
+                                    <p:cond delay="0"/>
+                                  </p:stCondLst>
+                                  <p:childTnLst>
+                                    <p:set>
+                                      <p:cBhvr>
+                                        <p:cTn id="6" dur="1" fill="hold">
+                                          <p:stCondLst>
+                                            <p:cond delay="0"/>
+                                          </p:stCondLst>
+                                        </p:cTn>
+                                        <p:tgtEl>
+                                          <p:spTgt spid="3">
+                                            <p:bg/>
+                                          </p:spTgt>
+                                        </p:tgtEl>
+                                        <p:attrNameLst>
+                                          <p:attrName>style.visibility</p:attrName>
+                                        </p:attrNameLst>
+                                      </p:cBhvr>
+                                      <p:to>
+                                        <p:strVal val="visible"/>
+                                      </p:to>
+                                    </p:set>
+                                    <p:anim calcmode="lin" valueType="num">
+                                      <p:cBhvr>
+                                        <p:cTn id="7" dur="1000" fill="hold"/>
+                                        <p:tgtEl>
+                                          <p:spTgt spid="3">
+                                            <p:bg/>
+                                          </p:spTgt>
+                                        </p:tgtEl>
+                                        <p:attrNameLst>
+                                          <p:attrName>ppt_w</p:attrName>
+                                        </p:attrNameLst>
+                                      </p:cBhvr>
+                                      <p:tavLst>
+                                        <p:tav tm="0">
+                                          <p:val>
+                                            <p:fltVal val="0"/>
+                                          </p:val>
+                                        </p:tav>
+                                        <p:tav tm="100000">
+                                          <p:val>
+                                            <p:strVal val="#ppt_w"/>
+                                          </p:val>
+                                        </p:tav>
+                                      </p:tavLst>
+                                    </p:anim>
+                                    <p:anim calcmode="lin" valueType="num">
+                                      <p:cBhvr>
+                                        <p:cTn id="8" dur="1000" fill="hold"/>
+                                        <p:tgtEl>
+                                          <p:spTgt spid="3">
+                                            <p:bg/>
+                                          </p:spTgt>
+                                        </p:tgtEl>
+                                        <p:attrNameLst>
+                                          <p:attrName>ppt_h</p:attrName>
+                                        </p:attrNameLst>
+                                      </p:cBhvr>
+                                      <p:tavLst>
+                                        <p:tav tm="0">
+                                          <p:val>
+                                            <p:fltVal val="0"/>
+                                          </p:val>
+                                        </p:tav>
+                                        <p:tav tm="100000">
+                                          <p:val>
+                                            <p:strVal val="#ppt_h"/>
+                                          </p:val>
+                                        </p:tav>
+                                      </p:tavLst>
+                                    </p:anim>
+                                    <p:anim calcmode="lin" valueType="num">
+                                      <p:cBhvr>
+                                        <p:cTn id="9" dur="1000" fill="hold"/>
+                                        <p:tgtEl>
+                                          <p:spTgt spid="3">
+                                            <p:bg/>
+                                          </p:spTgt>
+                                        </p:tgtEl>
+                                        <p:attrNameLst>
+                                          <p:attrName>style.rotation</p:attrName>
+                                        </p:attrNameLst>
+                                      </p:cBhvr>
+                                      <p:tavLst>
+                                        <p:tav tm="0">
+                                          <p:val>
+                                            <p:fltVal val="90"/>
+                                          </p:val>
+                                        </p:tav>
+                                        <p:tav tm="100000">
+                                          <p:val>
+                                            <p:fltVal val="0"/>
+                                          </p:val>
+                                        </p:tav>
+                                      </p:tavLst>
+                                    </p:anim>
+                                    <p:animEffect transition="in" filter="fade">
+                                      <p:cBhvr>
+                                        <p:cTn id="10" dur="1000"/>
+                                        <p:tgtEl>
+                                          <p:spTgt spid="3">
+                                            <p:bg/>
+                                          </p:spTgt>
+                                        </p:tgtEl>
+                                      </p:cBhvr>
+                                    </p:animEffect>
+                                  </p:childTnLst>
+                                </p:cTn>
+                              </p:par>
+                            </p:childTnLst>
+                          </p:cTn>
+                        </p:par>
+                      </p:childTnLst>
+                    </p:cTn>
+                  </p:par>
+                  <p:par>
+                    <p:cTn id="11" fill="hold">
+                      <p:stCondLst>
+                        <p:cond delay="indefinite"/>
+                      </p:stCondLst>
+                      <p:childTnLst>
+                        <p:par>
+                          <p:cTn id="12" fill="hold">
+                            <p:stCondLst>
+                              <p:cond delay="0"/>
+                            </p:stCondLst>
+                            <p:childTnLst>
+                              <p:par>
+                                <p:cTn id="13" presetID="31" presetClass="entr" presetSubtype="0" fill="hold" grpId="0" nodeType="clickEffect">
+                                  <p:stCondLst>
+                                    <p:cond delay="0"/>
+                                  </p:stCondLst>
+                                  <p:childTnLst>
+                                    <p:set>
+                                      <p:cBhvr>
+                                        <p:cTn id="14" dur="1" fill="hold">
+                                          <p:stCondLst>
+                                            <p:cond delay="0"/>
+                                          </p:stCondLst>
+                                        </p:cTn>
+                                        <p:tgtEl>
+                                          <p:spTgt spid="3">
+                                            <p:txEl>
+                                              <p:pRg st="0" end="0"/>
+                                            </p:txEl>
+                                          </p:spTgt>
+                                        </p:tgtEl>
+                                        <p:attrNameLst>
+                                          <p:attrName>style.visibility</p:attrName>
+                                        </p:attrNameLst>
+                                      </p:cBhvr>
+                                      <p:to>
+                                        <p:strVal val="visible"/>
+                                      </p:to>
+                                    </p:set>
+                                    <p:anim calcmode="lin" valueType="num">
+                                      <p:cBhvr>
+                                        <p:cTn id="15" dur="1000" fill="hold"/>
+                                        <p:tgtEl>
+                                          <p:spTgt spid="3">
+                                            <p:txEl>
+                                              <p:pRg st="0" end="0"/>
+                                            </p:txEl>
+                                          </p:spTgt>
+                                        </p:tgtEl>
+                                        <p:attrNameLst>
+                                          <p:attrName>ppt_w</p:attrName>
+                                        </p:attrNameLst>
+                                      </p:cBhvr>
+                                      <p:tavLst>
+                                        <p:tav tm="0">
+                                          <p:val>
+                                            <p:fltVal val="0"/>
+                                          </p:val>
+                                        </p:tav>
+                                        <p:tav tm="100000">
+                                          <p:val>
+                                            <p:strVal val="#ppt_w"/>
+                                          </p:val>
+                                        </p:tav>
+                                      </p:tavLst>
+                                    </p:anim>
+                                    <p:anim calcmode="lin" valueType="num">
+                                      <p:cBhvr>
+                                        <p:cTn id="16" dur="1000" fill="hold"/>
+                                        <p:tgtEl>
+                                          <p:spTgt spid="3">
+                                            <p:txEl>
+                                              <p:pRg st="0" end="0"/>
+                                            </p:txEl>
+                                          </p:spTgt>
+                                        </p:tgtEl>
+                                        <p:attrNameLst>
+                                          <p:attrName>ppt_h</p:attrName>
+                                        </p:attrNameLst>
+                                      </p:cBhvr>
+                                      <p:tavLst>
+                                        <p:tav tm="0">
+                                          <p:val>
+                                            <p:fltVal val="0"/>
+                                          </p:val>
+                                        </p:tav>
+                                        <p:tav tm="100000">
+                                          <p:val>
+                                            <p:strVal val="#ppt_h"/>
+                                          </p:val>
+                                        </p:tav>
+                                      </p:tavLst>
+                                    </p:anim>
+                                    <p:anim calcmode="lin" valueType="num">
+                                      <p:cBhvr>
+                                        <p:cTn id="17" dur="1000" fill="hold"/>
+                                        <p:tgtEl>
+                                          <p:spTgt spid="3">
+                                            <p:txEl>
+                                              <p:pRg st="0" end="0"/>
+                                            </p:txEl>
+                                          </p:spTgt>
+                                        </p:tgtEl>
+                                        <p:attrNameLst>
+                                          <p:attrName>style.rotation</p:attrName>
+                                        </p:attrNameLst>
+                                      </p:cBhvr>
+                                      <p:tavLst>
+                                        <p:tav tm="0">
+                                          <p:val>
+                                            <p:fltVal val="90"/>
+                                          </p:val>
+                                        </p:tav>
+                                        <p:tav tm="100000">
+                                          <p:val>
+                                            <p:fltVal val="0"/>
+                                          </p:val>
+                                        </p:tav>
+                                      </p:tavLst>
+                                    </p:anim>
+                                    <p:animEffect transition="in" filter="fade">
+                                      <p:cBhvr>
+                                        <p:cTn id="18" dur="1000"/>
+                                        <p:tgtEl>
+                                          <p:spTgt spid="3">
+                                            <p:txEl>
+                                              <p:pRg st="0" end="0"/>
+                                            </p:txEl>
+                                          </p:spTgt>
+                                        </p:tgtEl>
+                                      </p:cBhvr>
+                                    </p:animEffect>
+                                  </p:childTnLst>
+                                </p:cTn>
+                              </p:par>
+                            </p:childTnLst>
+                          </p:cTn>
+                        </p:par>
+                      </p:childTnLst>
+                    </p:cTn>
+                  </p:par>
+                  <p:par>
+                    <p:cTn id="19" fill="hold">
+                      <p:stCondLst>
+                        <p:cond delay="indefinite"/>
+                      </p:stCondLst>
+                      <p:childTnLst>
+                        <p:par>
+                          <p:cTn id="20" fill="hold">
+                            <p:stCondLst>
+                              <p:cond delay="0"/>
+                            </p:stCondLst>
+                            <p:childTnLst>
+                              <p:par>
+                                <p:cTn id="21" presetID="31" presetClass="entr" presetSubtype="0" fill="hold" grpId="0" nodeType="clickEffect">
+                                  <p:stCondLst>
+                                    <p:cond delay="0"/>
+                                  </p:stCondLst>
+                                  <p:childTnLst>
+                                    <p:set>
+                                      <p:cBhvr>
+                                        <p:cTn id="22" dur="1" fill="hold">
+                                          <p:stCondLst>
+                                            <p:cond delay="0"/>
+                                          </p:stCondLst>
+                                        </p:cTn>
+                                        <p:tgtEl>
+                                          <p:spTgt spid="2"/>
+                                        </p:tgtEl>
+                                        <p:attrNameLst>
+                                          <p:attrName>style.visibility</p:attrName>
+                                        </p:attrNameLst>
+                                      </p:cBhvr>
+                                      <p:to>
+                                        <p:strVal val="visible"/>
+                                      </p:to>
+                                    </p:set>
+                                    <p:anim calcmode="lin" valueType="num">
+                                      <p:cBhvr>
+                                        <p:cTn id="23" dur="1000" fill="hold"/>
+                                        <p:tgtEl>
+                                          <p:spTgt spid="2"/>
+                                        </p:tgtEl>
+                                        <p:attrNameLst>
+                                          <p:attrName>ppt_w</p:attrName>
+                                        </p:attrNameLst>
+                                      </p:cBhvr>
+                                      <p:tavLst>
+                                        <p:tav tm="0">
+                                          <p:val>
+                                            <p:fltVal val="0"/>
+                                          </p:val>
+                                        </p:tav>
+                                        <p:tav tm="100000">
+                                          <p:val>
+                                            <p:strVal val="#ppt_w"/>
+                                          </p:val>
+                                        </p:tav>
+                                      </p:tavLst>
+                                    </p:anim>
+                                    <p:anim calcmode="lin" valueType="num">
+                                      <p:cBhvr>
+                                        <p:cTn id="24" dur="1000" fill="hold"/>
+                                        <p:tgtEl>
+                                          <p:spTgt spid="2"/>
+                                        </p:tgtEl>
+                                        <p:attrNameLst>
+                                          <p:attrName>ppt_h</p:attrName>
+                                        </p:attrNameLst>
+                                      </p:cBhvr>
+                                      <p:tavLst>
+                                        <p:tav tm="0">
+                                          <p:val>
+                                            <p:fltVal val="0"/>
+                                          </p:val>
+                                        </p:tav>
+                                        <p:tav tm="100000">
+                                          <p:val>
+                                            <p:strVal val="#ppt_h"/>
+                                          </p:val>
+                                        </p:tav>
+                                      </p:tavLst>
+                                    </p:anim>
+                                    <p:anim calcmode="lin" valueType="num">
+                                      <p:cBhvr>
+                                        <p:cTn id="25" dur="1000" fill="hold"/>
+                                        <p:tgtEl>
+                                          <p:spTgt spid="2"/>
+                                        </p:tgtEl>
+                                        <p:attrNameLst>
+                                          <p:attrName>style.rotation</p:attrName>
+                                        </p:attrNameLst>
+                                      </p:cBhvr>
+                                      <p:tavLst>
+                                        <p:tav tm="0">
+                                          <p:val>
+                                            <p:fltVal val="90"/>
+                                          </p:val>
+                                        </p:tav>
+                                        <p:tav tm="100000">
+                                          <p:val>
+                                            <p:fltVal val="0"/>
+                                          </p:val>
+                                        </p:tav>
+                                      </p:tavLst>
+                                    </p:anim>
+                                    <p:animEffect transition="in" filter="fade">
+                                      <p:cBhvr>
+                                        <p:cTn id="26" dur="1000"/>
+                                        <p:tgtEl>
+                                          <p:spTgt spid="2"/>
+                                        </p:tgtEl>
+                                      </p:cBhvr>
+                                    </p:animEffect>
+                                  </p:childTnLst>
+                                </p:cTn>
+                              </p:par>
+                            </p:childTnLst>
+                          </p:cTn>
+                        </p:par>
+                      </p:childTnLst>
+                    </p:cTn>
+                  </p:par>
+                </p:childTnLst>
+              </p:cTn>
+              <p:prevCondLst>
+                <p:cond evt="onPrev" delay="0">
+                  <p:tgtEl>
+                    <p:sldTgt/>
+                  </p:tgtEl>
+                </p:cond>
+              </p:prevCondLst>
+              <p:nextCondLst>
+                <p:cond evt="onNext" delay="0">
+                  <p:tgtEl>
+                    <p:sldTgt/>
+                  </p:tgtEl>
+                </p:cond>
+              </p:nextCondLst>
+            </p:seq>
+          </p:childTnLst>
+        </p:cTn>
       </p:par>
     </p:tnLst>
+    <p:bldLst>
+      <p:bldP spid="3" grpId="0" build="p" animBg="1"/>
+      <p:bldP spid="2" grpId="0" animBg="1"/>
+    </p:bldLst>
   </p:timing>
 </p:sld>
 </file>

</xml_diff>